<commit_message>
added content to ConsumingRust
</commit_message>
<xml_diff>
--- a/Resources/ConsumingRust.pptx
+++ b/Resources/ConsumingRust.pptx
@@ -1,22 +1,20 @@
 
 <file path=ppt/presentation.xml><?xml version="1.0" encoding="utf-8"?>
-<p:presentation xmlns:a="http://schemas.openxmlformats.org/drawingml/2006/main" xmlns:r="http://schemas.openxmlformats.org/officeDocument/2006/relationships" xmlns:p="http://schemas.openxmlformats.org/presentationml/2006/main" showSpecialPlsOnTitleSld="0" saveSubsetFonts="1">
+<p:presentation xmlns:a="http://schemas.openxmlformats.org/drawingml/2006/main" xmlns:r="http://schemas.openxmlformats.org/officeDocument/2006/relationships" xmlns:p="http://schemas.openxmlformats.org/presentationml/2006/main" saveSubsetFonts="1">
   <p:sldMasterIdLst>
     <p:sldMasterId id="2147483648" r:id="rId1"/>
   </p:sldMasterIdLst>
-  <p:notesMasterIdLst>
-    <p:notesMasterId r:id="rId11"/>
-  </p:notesMasterIdLst>
   <p:sldIdLst>
     <p:sldId id="256" r:id="rId2"/>
-    <p:sldId id="257" r:id="rId3"/>
-    <p:sldId id="258" r:id="rId4"/>
-    <p:sldId id="259" r:id="rId5"/>
-    <p:sldId id="260" r:id="rId6"/>
-    <p:sldId id="262" r:id="rId7"/>
-    <p:sldId id="263" r:id="rId8"/>
-    <p:sldId id="261" r:id="rId9"/>
-    <p:sldId id="264" r:id="rId10"/>
+    <p:sldId id="264" r:id="rId3"/>
+    <p:sldId id="257" r:id="rId4"/>
+    <p:sldId id="258" r:id="rId5"/>
+    <p:sldId id="259" r:id="rId6"/>
+    <p:sldId id="260" r:id="rId7"/>
+    <p:sldId id="262" r:id="rId8"/>
+    <p:sldId id="263" r:id="rId9"/>
+    <p:sldId id="261" r:id="rId10"/>
+    <p:sldId id="265" r:id="rId11"/>
   </p:sldIdLst>
   <p:sldSz cx="12192000" cy="6858000"/>
   <p:notesSz cx="6858000" cy="9144000"/>
@@ -115,356 +113,20 @@
       </a:defRPr>
     </a:lvl9pPr>
   </p:defaultTextStyle>
+  <p:extLst>
+    <p:ext uri="{EFAFB233-063F-42B5-8137-9DF3F51BA10A}">
+      <p15:sldGuideLst xmlns:p15="http://schemas.microsoft.com/office/powerpoint/2012/main"/>
+    </p:ext>
+  </p:extLst>
 </p:presentation>
 </file>
 
-<file path=ppt/notesMasters/notesMaster1.xml><?xml version="1.0" encoding="utf-8"?>
-<p:notesMaster xmlns:a="http://schemas.openxmlformats.org/drawingml/2006/main" xmlns:r="http://schemas.openxmlformats.org/officeDocument/2006/relationships" xmlns:p="http://schemas.openxmlformats.org/presentationml/2006/main">
-  <p:cSld>
-    <p:bg>
-      <p:bgRef idx="1001">
-        <a:schemeClr val="bg1"/>
-      </p:bgRef>
-    </p:bg>
-    <p:spTree>
-      <p:nvGrpSpPr>
-        <p:cNvPr id="1" name=""/>
-        <p:cNvGrpSpPr/>
-        <p:nvPr/>
-      </p:nvGrpSpPr>
-      <p:grpSpPr>
-        <a:xfrm>
-          <a:off x="0" y="0"/>
-          <a:ext cx="0" cy="0"/>
-          <a:chOff x="0" y="0"/>
-          <a:chExt cx="0" cy="0"/>
-        </a:xfrm>
-      </p:grpSpPr>
-      <p:sp>
-        <p:nvSpPr>
-          <p:cNvPr id="2" name="Header Placeholder 1"/>
-          <p:cNvSpPr>
-            <a:spLocks noGrp="1"/>
-          </p:cNvSpPr>
-          <p:nvPr>
-            <p:ph type="hdr" sz="quarter"/>
-          </p:nvPr>
-        </p:nvSpPr>
-        <p:spPr>
-          <a:xfrm>
-            <a:off x="0" y="0"/>
-            <a:ext cx="2971800" cy="458788"/>
-          </a:xfrm>
-          <a:prstGeom prst="rect">
-            <a:avLst/>
-          </a:prstGeom>
-        </p:spPr>
-        <p:txBody>
-          <a:bodyPr vert="horz" lIns="91440" tIns="45720" rIns="91440" bIns="45720" rtlCol="0"/>
-          <a:lstStyle>
-            <a:lvl1pPr algn="l">
-              <a:defRPr sz="1200"/>
-            </a:lvl1pPr>
-          </a:lstStyle>
-          <a:p>
-            <a:endParaRPr lang="en-US"/>
-          </a:p>
-        </p:txBody>
-      </p:sp>
-      <p:sp>
-        <p:nvSpPr>
-          <p:cNvPr id="3" name="Date Placeholder 2"/>
-          <p:cNvSpPr>
-            <a:spLocks noGrp="1"/>
-          </p:cNvSpPr>
-          <p:nvPr>
-            <p:ph type="dt" idx="1"/>
-          </p:nvPr>
-        </p:nvSpPr>
-        <p:spPr>
-          <a:xfrm>
-            <a:off x="3884613" y="0"/>
-            <a:ext cx="2971800" cy="458788"/>
-          </a:xfrm>
-          <a:prstGeom prst="rect">
-            <a:avLst/>
-          </a:prstGeom>
-        </p:spPr>
-        <p:txBody>
-          <a:bodyPr vert="horz" lIns="91440" tIns="45720" rIns="91440" bIns="45720" rtlCol="0"/>
-          <a:lstStyle>
-            <a:lvl1pPr algn="r">
-              <a:defRPr sz="1200"/>
-            </a:lvl1pPr>
-          </a:lstStyle>
-          <a:p>
-            <a:fld id="{20D1FB56-F47B-4192-B8CA-E0923A26B036}" type="datetimeFigureOut">
-              <a:rPr lang="en-US" smtClean="0"/>
-              <a:t>5/26/2020</a:t>
-            </a:fld>
-            <a:endParaRPr lang="en-US"/>
-          </a:p>
-        </p:txBody>
-      </p:sp>
-      <p:sp>
-        <p:nvSpPr>
-          <p:cNvPr id="4" name="Slide Image Placeholder 3"/>
-          <p:cNvSpPr>
-            <a:spLocks noGrp="1" noRot="1" noChangeAspect="1"/>
-          </p:cNvSpPr>
-          <p:nvPr>
-            <p:ph type="sldImg" idx="2"/>
-          </p:nvPr>
-        </p:nvSpPr>
-        <p:spPr>
-          <a:xfrm>
-            <a:off x="685800" y="1143000"/>
-            <a:ext cx="5486400" cy="3086100"/>
-          </a:xfrm>
-          <a:prstGeom prst="rect">
-            <a:avLst/>
-          </a:prstGeom>
-          <a:noFill/>
-          <a:ln w="12700">
-            <a:solidFill>
-              <a:prstClr val="black"/>
-            </a:solidFill>
-          </a:ln>
-        </p:spPr>
-        <p:txBody>
-          <a:bodyPr vert="horz" lIns="91440" tIns="45720" rIns="91440" bIns="45720" rtlCol="0" anchor="ctr"/>
-          <a:lstStyle/>
-          <a:p>
-            <a:endParaRPr lang="en-US"/>
-          </a:p>
-        </p:txBody>
-      </p:sp>
-      <p:sp>
-        <p:nvSpPr>
-          <p:cNvPr id="5" name="Notes Placeholder 4"/>
-          <p:cNvSpPr>
-            <a:spLocks noGrp="1"/>
-          </p:cNvSpPr>
-          <p:nvPr>
-            <p:ph type="body" sz="quarter" idx="3"/>
-          </p:nvPr>
-        </p:nvSpPr>
-        <p:spPr>
-          <a:xfrm>
-            <a:off x="685800" y="4400550"/>
-            <a:ext cx="5486400" cy="3600450"/>
-          </a:xfrm>
-          <a:prstGeom prst="rect">
-            <a:avLst/>
-          </a:prstGeom>
-        </p:spPr>
-        <p:txBody>
-          <a:bodyPr vert="horz" lIns="91440" tIns="45720" rIns="91440" bIns="45720" rtlCol="0"/>
-          <a:lstStyle/>
-          <a:p>
-            <a:pPr lvl="0"/>
-            <a:r>
-              <a:rPr lang="en-US"/>
-              <a:t>Click to edit Master text styles</a:t>
-            </a:r>
-          </a:p>
-          <a:p>
-            <a:pPr lvl="1"/>
-            <a:r>
-              <a:rPr lang="en-US"/>
-              <a:t>Second level</a:t>
-            </a:r>
-          </a:p>
-          <a:p>
-            <a:pPr lvl="2"/>
-            <a:r>
-              <a:rPr lang="en-US"/>
-              <a:t>Third level</a:t>
-            </a:r>
-          </a:p>
-          <a:p>
-            <a:pPr lvl="3"/>
-            <a:r>
-              <a:rPr lang="en-US"/>
-              <a:t>Fourth level</a:t>
-            </a:r>
-          </a:p>
-          <a:p>
-            <a:pPr lvl="4"/>
-            <a:r>
-              <a:rPr lang="en-US"/>
-              <a:t>Fifth level</a:t>
-            </a:r>
-          </a:p>
-        </p:txBody>
-      </p:sp>
-      <p:sp>
-        <p:nvSpPr>
-          <p:cNvPr id="6" name="Footer Placeholder 5"/>
-          <p:cNvSpPr>
-            <a:spLocks noGrp="1"/>
-          </p:cNvSpPr>
-          <p:nvPr>
-            <p:ph type="ftr" sz="quarter" idx="4"/>
-          </p:nvPr>
-        </p:nvSpPr>
-        <p:spPr>
-          <a:xfrm>
-            <a:off x="0" y="8685213"/>
-            <a:ext cx="2971800" cy="458787"/>
-          </a:xfrm>
-          <a:prstGeom prst="rect">
-            <a:avLst/>
-          </a:prstGeom>
-        </p:spPr>
-        <p:txBody>
-          <a:bodyPr vert="horz" lIns="91440" tIns="45720" rIns="91440" bIns="45720" rtlCol="0" anchor="b"/>
-          <a:lstStyle>
-            <a:lvl1pPr algn="l">
-              <a:defRPr sz="1200"/>
-            </a:lvl1pPr>
-          </a:lstStyle>
-          <a:p>
-            <a:endParaRPr lang="en-US"/>
-          </a:p>
-        </p:txBody>
-      </p:sp>
-      <p:sp>
-        <p:nvSpPr>
-          <p:cNvPr id="7" name="Slide Number Placeholder 6"/>
-          <p:cNvSpPr>
-            <a:spLocks noGrp="1"/>
-          </p:cNvSpPr>
-          <p:nvPr>
-            <p:ph type="sldNum" sz="quarter" idx="5"/>
-          </p:nvPr>
-        </p:nvSpPr>
-        <p:spPr>
-          <a:xfrm>
-            <a:off x="3884613" y="8685213"/>
-            <a:ext cx="2971800" cy="458787"/>
-          </a:xfrm>
-          <a:prstGeom prst="rect">
-            <a:avLst/>
-          </a:prstGeom>
-        </p:spPr>
-        <p:txBody>
-          <a:bodyPr vert="horz" lIns="91440" tIns="45720" rIns="91440" bIns="45720" rtlCol="0" anchor="b"/>
-          <a:lstStyle>
-            <a:lvl1pPr algn="r">
-              <a:defRPr sz="1200"/>
-            </a:lvl1pPr>
-          </a:lstStyle>
-          <a:p>
-            <a:fld id="{755622C3-343A-4893-9BFB-1A34376893EC}" type="slidenum">
-              <a:rPr lang="en-US" smtClean="0"/>
-              <a:t>‹#›</a:t>
-            </a:fld>
-            <a:endParaRPr lang="en-US"/>
-          </a:p>
-        </p:txBody>
-      </p:sp>
-    </p:spTree>
-    <p:extLst>
-      <p:ext uri="{BB962C8B-B14F-4D97-AF65-F5344CB8AC3E}">
-        <p14:creationId xmlns:p14="http://schemas.microsoft.com/office/powerpoint/2010/main" val="2091977814"/>
-      </p:ext>
-    </p:extLst>
-  </p:cSld>
-  <p:clrMap bg1="lt1" tx1="dk1" bg2="lt2" tx2="dk2" accent1="accent1" accent2="accent2" accent3="accent3" accent4="accent4" accent5="accent5" accent6="accent6" hlink="hlink" folHlink="folHlink"/>
-  <p:notesStyle>
-    <a:lvl1pPr marL="0" algn="l" defTabSz="914400" rtl="0" eaLnBrk="1" latinLnBrk="0" hangingPunct="1">
-      <a:defRPr sz="1200" kern="1200">
-        <a:solidFill>
-          <a:schemeClr val="tx1"/>
-        </a:solidFill>
-        <a:latin typeface="+mn-lt"/>
-        <a:ea typeface="+mn-ea"/>
-        <a:cs typeface="+mn-cs"/>
-      </a:defRPr>
-    </a:lvl1pPr>
-    <a:lvl2pPr marL="457200" algn="l" defTabSz="914400" rtl="0" eaLnBrk="1" latinLnBrk="0" hangingPunct="1">
-      <a:defRPr sz="1200" kern="1200">
-        <a:solidFill>
-          <a:schemeClr val="tx1"/>
-        </a:solidFill>
-        <a:latin typeface="+mn-lt"/>
-        <a:ea typeface="+mn-ea"/>
-        <a:cs typeface="+mn-cs"/>
-      </a:defRPr>
-    </a:lvl2pPr>
-    <a:lvl3pPr marL="914400" algn="l" defTabSz="914400" rtl="0" eaLnBrk="1" latinLnBrk="0" hangingPunct="1">
-      <a:defRPr sz="1200" kern="1200">
-        <a:solidFill>
-          <a:schemeClr val="tx1"/>
-        </a:solidFill>
-        <a:latin typeface="+mn-lt"/>
-        <a:ea typeface="+mn-ea"/>
-        <a:cs typeface="+mn-cs"/>
-      </a:defRPr>
-    </a:lvl3pPr>
-    <a:lvl4pPr marL="1371600" algn="l" defTabSz="914400" rtl="0" eaLnBrk="1" latinLnBrk="0" hangingPunct="1">
-      <a:defRPr sz="1200" kern="1200">
-        <a:solidFill>
-          <a:schemeClr val="tx1"/>
-        </a:solidFill>
-        <a:latin typeface="+mn-lt"/>
-        <a:ea typeface="+mn-ea"/>
-        <a:cs typeface="+mn-cs"/>
-      </a:defRPr>
-    </a:lvl4pPr>
-    <a:lvl5pPr marL="1828800" algn="l" defTabSz="914400" rtl="0" eaLnBrk="1" latinLnBrk="0" hangingPunct="1">
-      <a:defRPr sz="1200" kern="1200">
-        <a:solidFill>
-          <a:schemeClr val="tx1"/>
-        </a:solidFill>
-        <a:latin typeface="+mn-lt"/>
-        <a:ea typeface="+mn-ea"/>
-        <a:cs typeface="+mn-cs"/>
-      </a:defRPr>
-    </a:lvl5pPr>
-    <a:lvl6pPr marL="2286000" algn="l" defTabSz="914400" rtl="0" eaLnBrk="1" latinLnBrk="0" hangingPunct="1">
-      <a:defRPr sz="1200" kern="1200">
-        <a:solidFill>
-          <a:schemeClr val="tx1"/>
-        </a:solidFill>
-        <a:latin typeface="+mn-lt"/>
-        <a:ea typeface="+mn-ea"/>
-        <a:cs typeface="+mn-cs"/>
-      </a:defRPr>
-    </a:lvl6pPr>
-    <a:lvl7pPr marL="2743200" algn="l" defTabSz="914400" rtl="0" eaLnBrk="1" latinLnBrk="0" hangingPunct="1">
-      <a:defRPr sz="1200" kern="1200">
-        <a:solidFill>
-          <a:schemeClr val="tx1"/>
-        </a:solidFill>
-        <a:latin typeface="+mn-lt"/>
-        <a:ea typeface="+mn-ea"/>
-        <a:cs typeface="+mn-cs"/>
-      </a:defRPr>
-    </a:lvl7pPr>
-    <a:lvl8pPr marL="3200400" algn="l" defTabSz="914400" rtl="0" eaLnBrk="1" latinLnBrk="0" hangingPunct="1">
-      <a:defRPr sz="1200" kern="1200">
-        <a:solidFill>
-          <a:schemeClr val="tx1"/>
-        </a:solidFill>
-        <a:latin typeface="+mn-lt"/>
-        <a:ea typeface="+mn-ea"/>
-        <a:cs typeface="+mn-cs"/>
-      </a:defRPr>
-    </a:lvl8pPr>
-    <a:lvl9pPr marL="3657600" algn="l" defTabSz="914400" rtl="0" eaLnBrk="1" latinLnBrk="0" hangingPunct="1">
-      <a:defRPr sz="1200" kern="1200">
-        <a:solidFill>
-          <a:schemeClr val="tx1"/>
-        </a:solidFill>
-        <a:latin typeface="+mn-lt"/>
-        <a:ea typeface="+mn-ea"/>
-        <a:cs typeface="+mn-cs"/>
-      </a:defRPr>
-    </a:lvl9pPr>
-  </p:notesStyle>
-</p:notesMaster>
+<file path=ppt/revisionInfo.xml><?xml version="1.0" encoding="utf-8"?>
+<p1510:revInfo xmlns:a="http://schemas.openxmlformats.org/drawingml/2006/main" xmlns:r="http://schemas.openxmlformats.org/officeDocument/2006/relationships" xmlns:p1510="http://schemas.microsoft.com/office/powerpoint/2015/10/main">
+  <p1510:revLst>
+    <p1510:client id="{56EA90EB-F7A6-43BA-A4B4-2EFBC6BD7929}" v="4" dt="2020-05-26T23:37:40.863"/>
+  </p1510:revLst>
+</p1510:revInfo>
 </file>
 
 <file path=ppt/slideLayouts/slideLayout1.xml><?xml version="1.0" encoding="utf-8"?>
@@ -612,7 +274,7 @@
           <a:bodyPr/>
           <a:lstStyle/>
           <a:p>
-            <a:fld id="{54DDA4F1-968B-4AFA-8014-B63D7012017A}" type="datetime1">
+            <a:fld id="{0EFE2675-32ED-497E-A2F7-9E43B37B7B14}" type="datetimeFigureOut">
               <a:rPr lang="en-US" smtClean="0"/>
               <a:t>5/26/2020</a:t>
             </a:fld>
@@ -810,7 +472,7 @@
           <a:bodyPr/>
           <a:lstStyle/>
           <a:p>
-            <a:fld id="{F2F9EFF3-3DDD-4D98-92AC-1C27F48C1B34}" type="datetime1">
+            <a:fld id="{0EFE2675-32ED-497E-A2F7-9E43B37B7B14}" type="datetimeFigureOut">
               <a:rPr lang="en-US" smtClean="0"/>
               <a:t>5/26/2020</a:t>
             </a:fld>
@@ -1018,7 +680,7 @@
           <a:bodyPr/>
           <a:lstStyle/>
           <a:p>
-            <a:fld id="{9A61BC6E-EEBD-4229-A482-0A5BB5B38B84}" type="datetime1">
+            <a:fld id="{0EFE2675-32ED-497E-A2F7-9E43B37B7B14}" type="datetimeFigureOut">
               <a:rPr lang="en-US" smtClean="0"/>
               <a:t>5/26/2020</a:t>
             </a:fld>
@@ -1226,7 +888,7 @@
           <a:bodyPr/>
           <a:lstStyle/>
           <a:p>
-            <a:fld id="{49C40878-BD44-44E0-ACC7-235C87D061B6}" type="datetime1">
+            <a:fld id="{0EFE2675-32ED-497E-A2F7-9E43B37B7B14}" type="datetimeFigureOut">
               <a:rPr lang="en-US" smtClean="0"/>
               <a:t>5/26/2020</a:t>
             </a:fld>
@@ -1278,18 +940,13 @@
         <p:spPr/>
         <p:txBody>
           <a:bodyPr/>
-          <a:lstStyle>
-            <a:lvl1pPr>
-              <a:defRPr sz="1800"/>
-            </a:lvl1pPr>
-          </a:lstStyle>
+          <a:lstStyle/>
           <a:p>
             <a:fld id="{18FB5E7C-3A32-495C-8F65-DCFD1AE188CA}" type="slidenum">
               <a:rPr lang="en-US" smtClean="0"/>
-              <a:pPr/>
               <a:t>‹#›</a:t>
             </a:fld>
-            <a:endParaRPr lang="en-US" dirty="0"/>
+            <a:endParaRPr lang="en-US"/>
           </a:p>
         </p:txBody>
       </p:sp>
@@ -1506,7 +1163,7 @@
           <a:bodyPr/>
           <a:lstStyle/>
           <a:p>
-            <a:fld id="{7D27DB9B-C714-4D54-8C06-60F9F10DFA91}" type="datetime1">
+            <a:fld id="{0EFE2675-32ED-497E-A2F7-9E43B37B7B14}" type="datetimeFigureOut">
               <a:rPr lang="en-US" smtClean="0"/>
               <a:t>5/26/2020</a:t>
             </a:fld>
@@ -1776,7 +1433,7 @@
           <a:bodyPr/>
           <a:lstStyle/>
           <a:p>
-            <a:fld id="{26AC6A84-808B-4CB2-8EE2-BC71A784BD5D}" type="datetime1">
+            <a:fld id="{0EFE2675-32ED-497E-A2F7-9E43B37B7B14}" type="datetimeFigureOut">
               <a:rPr lang="en-US" smtClean="0"/>
               <a:t>5/26/2020</a:t>
             </a:fld>
@@ -2188,7 +1845,7 @@
           <a:bodyPr/>
           <a:lstStyle/>
           <a:p>
-            <a:fld id="{D3A0A1C8-473E-4566-BF2F-EEB4E837BDA9}" type="datetime1">
+            <a:fld id="{0EFE2675-32ED-497E-A2F7-9E43B37B7B14}" type="datetimeFigureOut">
               <a:rPr lang="en-US" smtClean="0"/>
               <a:t>5/26/2020</a:t>
             </a:fld>
@@ -2334,7 +1991,7 @@
           <a:bodyPr/>
           <a:lstStyle/>
           <a:p>
-            <a:fld id="{EB9F2C45-4E44-4AAB-BC47-AF8E581E6197}" type="datetime1">
+            <a:fld id="{0EFE2675-32ED-497E-A2F7-9E43B37B7B14}" type="datetimeFigureOut">
               <a:rPr lang="en-US" smtClean="0"/>
               <a:t>5/26/2020</a:t>
             </a:fld>
@@ -2447,7 +2104,7 @@
           <a:bodyPr/>
           <a:lstStyle/>
           <a:p>
-            <a:fld id="{83963B06-4720-453B-AE68-931BFBDBE045}" type="datetime1">
+            <a:fld id="{0EFE2675-32ED-497E-A2F7-9E43B37B7B14}" type="datetimeFigureOut">
               <a:rPr lang="en-US" smtClean="0"/>
               <a:t>5/26/2020</a:t>
             </a:fld>
@@ -2758,7 +2415,7 @@
           <a:bodyPr/>
           <a:lstStyle/>
           <a:p>
-            <a:fld id="{78DD5B7A-3403-4EBD-8BA6-9927A94E1E24}" type="datetime1">
+            <a:fld id="{0EFE2675-32ED-497E-A2F7-9E43B37B7B14}" type="datetimeFigureOut">
               <a:rPr lang="en-US" smtClean="0"/>
               <a:t>5/26/2020</a:t>
             </a:fld>
@@ -3046,7 +2703,7 @@
           <a:bodyPr/>
           <a:lstStyle/>
           <a:p>
-            <a:fld id="{80B95494-CC7B-4AC7-8417-E0B9ED27EC4A}" type="datetime1">
+            <a:fld id="{0EFE2675-32ED-497E-A2F7-9E43B37B7B14}" type="datetimeFigureOut">
               <a:rPr lang="en-US" smtClean="0"/>
               <a:t>5/26/2020</a:t>
             </a:fld>
@@ -3287,7 +2944,7 @@
             </a:lvl1pPr>
           </a:lstStyle>
           <a:p>
-            <a:fld id="{89938513-0410-4BC1-880E-24CDF3284B90}" type="datetime1">
+            <a:fld id="{0EFE2675-32ED-497E-A2F7-9E43B37B7B14}" type="datetimeFigureOut">
               <a:rPr lang="en-US" smtClean="0"/>
               <a:t>5/26/2020</a:t>
             </a:fld>
@@ -3406,7 +3063,6 @@
     <p:sldLayoutId id="2147483658" r:id="rId10"/>
     <p:sldLayoutId id="2147483659" r:id="rId11"/>
   </p:sldLayoutIdLst>
-  <p:hf hdr="0" ftr="0" dt="0"/>
   <p:txStyles>
     <p:titleStyle>
       <a:lvl1pPr algn="l" defTabSz="914400" rtl="0" eaLnBrk="1" latinLnBrk="0" hangingPunct="1">
@@ -3794,6 +3450,98 @@
 </p:sld>
 </file>
 
+<file path=ppt/slides/slide10.xml><?xml version="1.0" encoding="utf-8"?>
+<p:sld xmlns:a="http://schemas.openxmlformats.org/drawingml/2006/main" xmlns:r="http://schemas.openxmlformats.org/officeDocument/2006/relationships" xmlns:p="http://schemas.openxmlformats.org/presentationml/2006/main">
+  <p:cSld>
+    <p:spTree>
+      <p:nvGrpSpPr>
+        <p:cNvPr id="1" name=""/>
+        <p:cNvGrpSpPr/>
+        <p:nvPr/>
+      </p:nvGrpSpPr>
+      <p:grpSpPr>
+        <a:xfrm>
+          <a:off x="0" y="0"/>
+          <a:ext cx="0" cy="0"/>
+          <a:chOff x="0" y="0"/>
+          <a:chExt cx="0" cy="0"/>
+        </a:xfrm>
+      </p:grpSpPr>
+      <p:sp>
+        <p:nvSpPr>
+          <p:cNvPr id="4" name="Title 3">
+            <a:extLst>
+              <a:ext uri="{FF2B5EF4-FFF2-40B4-BE49-F238E27FC236}">
+                <a16:creationId xmlns:a16="http://schemas.microsoft.com/office/drawing/2014/main" id="{5ACF11D8-D89D-4587-AEE3-7AA091098762}"/>
+              </a:ext>
+            </a:extLst>
+          </p:cNvPr>
+          <p:cNvSpPr>
+            <a:spLocks noGrp="1"/>
+          </p:cNvSpPr>
+          <p:nvPr>
+            <p:ph type="ctrTitle"/>
+          </p:nvPr>
+        </p:nvSpPr>
+        <p:spPr/>
+        <p:txBody>
+          <a:bodyPr/>
+          <a:lstStyle/>
+          <a:p>
+            <a:r>
+              <a:rPr lang="en-US" dirty="0"/>
+              <a:t>That’s all until Bite #2</a:t>
+            </a:r>
+          </a:p>
+        </p:txBody>
+      </p:sp>
+      <p:sp>
+        <p:nvSpPr>
+          <p:cNvPr id="5" name="Subtitle 4">
+            <a:extLst>
+              <a:ext uri="{FF2B5EF4-FFF2-40B4-BE49-F238E27FC236}">
+                <a16:creationId xmlns:a16="http://schemas.microsoft.com/office/drawing/2014/main" id="{1C178C3B-A2B6-497F-A2F8-7A4B374223CE}"/>
+              </a:ext>
+            </a:extLst>
+          </p:cNvPr>
+          <p:cNvSpPr>
+            <a:spLocks noGrp="1"/>
+          </p:cNvSpPr>
+          <p:nvPr>
+            <p:ph type="subTitle" idx="1"/>
+          </p:nvPr>
+        </p:nvSpPr>
+        <p:spPr>
+          <a:xfrm>
+            <a:off x="1524000" y="4097350"/>
+            <a:ext cx="9144000" cy="1160449"/>
+          </a:xfrm>
+        </p:spPr>
+        <p:txBody>
+          <a:bodyPr/>
+          <a:lstStyle/>
+          <a:p>
+            <a:pPr algn="l"/>
+            <a:r>
+              <a:rPr lang="en-US" dirty="0"/>
+              <a:t>Bite #2 covers data ownership, taking us into the core of what makes Rust the language that it is.</a:t>
+            </a:r>
+          </a:p>
+        </p:txBody>
+      </p:sp>
+    </p:spTree>
+    <p:extLst>
+      <p:ext uri="{BB962C8B-B14F-4D97-AF65-F5344CB8AC3E}">
+        <p14:creationId xmlns:p14="http://schemas.microsoft.com/office/powerpoint/2010/main" val="1885980827"/>
+      </p:ext>
+    </p:extLst>
+  </p:cSld>
+  <p:clrMapOvr>
+    <a:masterClrMapping/>
+  </p:clrMapOvr>
+</p:sld>
+</file>
+
 <file path=ppt/slides/slide2.xml><?xml version="1.0" encoding="utf-8"?>
 <p:sld xmlns:a="http://schemas.openxmlformats.org/drawingml/2006/main" xmlns:r="http://schemas.openxmlformats.org/officeDocument/2006/relationships" xmlns:p="http://schemas.openxmlformats.org/presentationml/2006/main">
   <p:cSld>
@@ -3816,7 +3564,7 @@
           <p:cNvPr id="2" name="Title 1">
             <a:extLst>
               <a:ext uri="{FF2B5EF4-FFF2-40B4-BE49-F238E27FC236}">
-                <a16:creationId xmlns:a16="http://schemas.microsoft.com/office/drawing/2014/main" id="{D810D046-8EB3-4CA4-8E59-20F13F3F9D6F}"/>
+                <a16:creationId xmlns:a16="http://schemas.microsoft.com/office/drawing/2014/main" id="{BBC66D9E-3830-48C5-8A3A-5B0D4EDF0946}"/>
               </a:ext>
             </a:extLst>
           </p:cNvPr>
@@ -3827,14 +3575,19 @@
             <p:ph type="title"/>
           </p:nvPr>
         </p:nvSpPr>
-        <p:spPr/>
-        <p:txBody>
-          <a:bodyPr/>
-          <a:lstStyle/>
-          <a:p>
-            <a:r>
-              <a:rPr lang="en-US" dirty="0"/>
-              <a:t>What is this?</a:t>
+        <p:spPr>
+          <a:xfrm>
+            <a:off x="838200" y="365126"/>
+            <a:ext cx="10515600" cy="563234"/>
+          </a:xfrm>
+        </p:spPr>
+        <p:txBody>
+          <a:bodyPr/>
+          <a:lstStyle/>
+          <a:p>
+            <a:r>
+              <a:rPr lang="en-US" dirty="0"/>
+              <a:t>Why Rust?</a:t>
             </a:r>
           </a:p>
         </p:txBody>
@@ -3844,7 +3597,7 @@
           <p:cNvPr id="3" name="Content Placeholder 2">
             <a:extLst>
               <a:ext uri="{FF2B5EF4-FFF2-40B4-BE49-F238E27FC236}">
-                <a16:creationId xmlns:a16="http://schemas.microsoft.com/office/drawing/2014/main" id="{07D17E04-A925-46F7-81D9-E1D3E526719C}"/>
+                <a16:creationId xmlns:a16="http://schemas.microsoft.com/office/drawing/2014/main" id="{646C3297-F1DA-456C-B17B-67AD17832185}"/>
               </a:ext>
             </a:extLst>
           </p:cNvPr>
@@ -3855,72 +3608,79 @@
             <p:ph idx="1"/>
           </p:nvPr>
         </p:nvSpPr>
-        <p:spPr/>
-        <p:txBody>
-          <a:bodyPr/>
-          <a:lstStyle/>
-          <a:p>
-            <a:r>
-              <a:rPr lang="en-US" dirty="0"/>
-              <a:t>This is the first in a series of brief presentations about the Rust programming language:</a:t>
+        <p:spPr>
+          <a:xfrm>
+            <a:off x="838200" y="1186626"/>
+            <a:ext cx="10515600" cy="4990337"/>
+          </a:xfrm>
+        </p:spPr>
+        <p:txBody>
+          <a:bodyPr/>
+          <a:lstStyle/>
+          <a:p>
+            <a:r>
+              <a:rPr lang="en-US" dirty="0"/>
+              <a:t>Memory and Data Race safety</a:t>
             </a:r>
           </a:p>
           <a:p>
             <a:pPr lvl="1"/>
             <a:r>
               <a:rPr lang="en-US" dirty="0"/>
-              <a:t>Each presentation will be brief – a few slides</a:t>
+              <a:t>Enforced data ownership rules insure Memory and Data Race safety.</a:t>
+            </a:r>
+          </a:p>
+          <a:p>
+            <a:r>
+              <a:rPr lang="en-US" dirty="0"/>
+              <a:t>Error Handling</a:t>
             </a:r>
           </a:p>
           <a:p>
             <a:pPr lvl="1"/>
             <a:r>
               <a:rPr lang="en-US" dirty="0"/>
-              <a:t>Each will focus on one part of the Rust language</a:t>
+              <a:t>Any function that can fail returns a result indicating success or failure.  Code has to handle errors in well defined ways.</a:t>
+            </a:r>
+          </a:p>
+          <a:p>
+            <a:r>
+              <a:rPr lang="en-US" dirty="0"/>
+              <a:t>Performance</a:t>
             </a:r>
           </a:p>
           <a:p>
             <a:pPr lvl="1"/>
             <a:r>
               <a:rPr lang="en-US" dirty="0"/>
-              <a:t>The series will build in bite sized chunks: easy to grasp, quick to consume.</a:t>
-            </a:r>
-          </a:p>
-        </p:txBody>
-      </p:sp>
-      <p:sp>
-        <p:nvSpPr>
-          <p:cNvPr id="4" name="Slide Number Placeholder 3">
-            <a:extLst>
-              <a:ext uri="{FF2B5EF4-FFF2-40B4-BE49-F238E27FC236}">
-                <a16:creationId xmlns:a16="http://schemas.microsoft.com/office/drawing/2014/main" id="{12BBAA68-FA43-42AC-BAA3-994CFBFFE15A}"/>
-              </a:ext>
-            </a:extLst>
-          </p:cNvPr>
-          <p:cNvSpPr>
-            <a:spLocks noGrp="1"/>
-          </p:cNvSpPr>
-          <p:nvPr>
-            <p:ph type="sldNum" sz="quarter" idx="12"/>
-          </p:nvPr>
-        </p:nvSpPr>
-        <p:spPr/>
-        <p:txBody>
-          <a:bodyPr/>
-          <a:lstStyle/>
-          <a:p>
-            <a:fld id="{18FB5E7C-3A32-495C-8F65-DCFD1AE188CA}" type="slidenum">
-              <a:rPr lang="en-US" smtClean="0"/>
-              <a:t>2</a:t>
-            </a:fld>
-            <a:endParaRPr lang="en-US"/>
+              <a:t>Rust compiles to native code and does not need garbage collection, so it is as fast as C and C++.</a:t>
+            </a:r>
+          </a:p>
+          <a:p>
+            <a:r>
+              <a:rPr lang="en-US" dirty="0"/>
+              <a:t>Simple Value Behavior</a:t>
+            </a:r>
+          </a:p>
+          <a:p>
+            <a:pPr lvl="1"/>
+            <a:r>
+              <a:rPr lang="en-US" dirty="0"/>
+              <a:t>Rust supports value behavior without the need to define copy and move constructors and assignment operators.</a:t>
+            </a:r>
+          </a:p>
+          <a:p>
+            <a:r>
+              <a:rPr lang="en-US" dirty="0"/>
+              <a:t>Extraordinarily effective tool chain</a:t>
+            </a:r>
           </a:p>
         </p:txBody>
       </p:sp>
     </p:spTree>
     <p:extLst>
       <p:ext uri="{BB962C8B-B14F-4D97-AF65-F5344CB8AC3E}">
-        <p14:creationId xmlns:p14="http://schemas.microsoft.com/office/powerpoint/2010/main" val="3026248647"/>
+        <p14:creationId xmlns:p14="http://schemas.microsoft.com/office/powerpoint/2010/main" val="3072520656"/>
       </p:ext>
     </p:extLst>
   </p:cSld>
@@ -3952,7 +3712,7 @@
           <p:cNvPr id="2" name="Title 1">
             <a:extLst>
               <a:ext uri="{FF2B5EF4-FFF2-40B4-BE49-F238E27FC236}">
-                <a16:creationId xmlns:a16="http://schemas.microsoft.com/office/drawing/2014/main" id="{1B3C2E89-4964-4F8B-A474-1925CA7751D2}"/>
+                <a16:creationId xmlns:a16="http://schemas.microsoft.com/office/drawing/2014/main" id="{D810D046-8EB3-4CA4-8E59-20F13F3F9D6F}"/>
               </a:ext>
             </a:extLst>
           </p:cNvPr>
@@ -3970,7 +3730,7 @@
           <a:p>
             <a:r>
               <a:rPr lang="en-US" dirty="0"/>
-              <a:t>Bite #1 – Rust Data</a:t>
+              <a:t>What is this?</a:t>
             </a:r>
           </a:p>
         </p:txBody>
@@ -3980,7 +3740,7 @@
           <p:cNvPr id="3" name="Content Placeholder 2">
             <a:extLst>
               <a:ext uri="{FF2B5EF4-FFF2-40B4-BE49-F238E27FC236}">
-                <a16:creationId xmlns:a16="http://schemas.microsoft.com/office/drawing/2014/main" id="{404BAA01-8102-4B2E-B20D-F2BDADD7B98B}"/>
+                <a16:creationId xmlns:a16="http://schemas.microsoft.com/office/drawing/2014/main" id="{07D17E04-A925-46F7-81D9-E1D3E526719C}"/>
               </a:ext>
             </a:extLst>
           </p:cNvPr>
@@ -3998,72 +3758,36 @@
           <a:p>
             <a:r>
               <a:rPr lang="en-US" dirty="0"/>
-              <a:t>In this Bite our goal is to understand the terms:</a:t>
+              <a:t>This is the first in a series of brief presentations about the Rust programming language:</a:t>
             </a:r>
           </a:p>
           <a:p>
             <a:pPr lvl="1"/>
             <a:r>
               <a:rPr lang="en-US" dirty="0"/>
-              <a:t>Bind – associate an identifier with a value</a:t>
+              <a:t>Each presentation will be brief – a few slides</a:t>
             </a:r>
           </a:p>
           <a:p>
             <a:pPr lvl="1"/>
             <a:r>
               <a:rPr lang="en-US" dirty="0"/>
-              <a:t>Copy – bind to a copy of a Copy type</a:t>
+              <a:t>Each will focus on one part of the Rust language</a:t>
             </a:r>
           </a:p>
           <a:p>
             <a:pPr lvl="1"/>
             <a:r>
               <a:rPr lang="en-US" dirty="0"/>
-              <a:t>Move – transfer ownership of a value</a:t>
-            </a:r>
-          </a:p>
-          <a:p>
-            <a:pPr lvl="1"/>
-            <a:r>
-              <a:rPr lang="en-US" dirty="0"/>
-              <a:t>Clone – make a clone of a !Copy type</a:t>
-            </a:r>
-          </a:p>
-        </p:txBody>
-      </p:sp>
-      <p:sp>
-        <p:nvSpPr>
-          <p:cNvPr id="4" name="Slide Number Placeholder 3">
-            <a:extLst>
-              <a:ext uri="{FF2B5EF4-FFF2-40B4-BE49-F238E27FC236}">
-                <a16:creationId xmlns:a16="http://schemas.microsoft.com/office/drawing/2014/main" id="{4233163E-F5F3-443A-B3A5-921A886BC0DB}"/>
-              </a:ext>
-            </a:extLst>
-          </p:cNvPr>
-          <p:cNvSpPr>
-            <a:spLocks noGrp="1"/>
-          </p:cNvSpPr>
-          <p:nvPr>
-            <p:ph type="sldNum" sz="quarter" idx="12"/>
-          </p:nvPr>
-        </p:nvSpPr>
-        <p:spPr/>
-        <p:txBody>
-          <a:bodyPr/>
-          <a:lstStyle/>
-          <a:p>
-            <a:fld id="{18FB5E7C-3A32-495C-8F65-DCFD1AE188CA}" type="slidenum">
-              <a:rPr lang="en-US" smtClean="0"/>
-              <a:t>3</a:t>
-            </a:fld>
-            <a:endParaRPr lang="en-US"/>
+              <a:t>The series will build in bite sized chunks: easy to grasp, quick to consume.</a:t>
+            </a:r>
           </a:p>
         </p:txBody>
       </p:sp>
     </p:spTree>
     <p:extLst>
       <p:ext uri="{BB962C8B-B14F-4D97-AF65-F5344CB8AC3E}">
-        <p14:creationId xmlns:p14="http://schemas.microsoft.com/office/powerpoint/2010/main" val="400171579"/>
+        <p14:creationId xmlns:p14="http://schemas.microsoft.com/office/powerpoint/2010/main" val="3026248647"/>
       </p:ext>
     </p:extLst>
   </p:cSld>
@@ -4095,7 +3819,7 @@
           <p:cNvPr id="2" name="Title 1">
             <a:extLst>
               <a:ext uri="{FF2B5EF4-FFF2-40B4-BE49-F238E27FC236}">
-                <a16:creationId xmlns:a16="http://schemas.microsoft.com/office/drawing/2014/main" id="{A00843C5-EA74-48F5-A408-471881062CCD}"/>
+                <a16:creationId xmlns:a16="http://schemas.microsoft.com/office/drawing/2014/main" id="{1B3C2E89-4964-4F8B-A474-1925CA7751D2}"/>
               </a:ext>
             </a:extLst>
           </p:cNvPr>
@@ -4113,7 +3837,7 @@
           <a:p>
             <a:r>
               <a:rPr lang="en-US" dirty="0"/>
-              <a:t>Bite #1 – Binding to a value</a:t>
+              <a:t>Bite #1 – Rust Data</a:t>
             </a:r>
           </a:p>
         </p:txBody>
@@ -4123,7 +3847,7 @@
           <p:cNvPr id="3" name="Content Placeholder 2">
             <a:extLst>
               <a:ext uri="{FF2B5EF4-FFF2-40B4-BE49-F238E27FC236}">
-                <a16:creationId xmlns:a16="http://schemas.microsoft.com/office/drawing/2014/main" id="{05B05327-6881-4B3B-9A98-BA36132F44F5}"/>
+                <a16:creationId xmlns:a16="http://schemas.microsoft.com/office/drawing/2014/main" id="{404BAA01-8102-4B2E-B20D-F2BDADD7B98B}"/>
               </a:ext>
             </a:extLst>
           </p:cNvPr>
@@ -4141,134 +3865,43 @@
           <a:p>
             <a:r>
               <a:rPr lang="en-US" dirty="0"/>
-              <a:t>Bind – associating an identifier with a memory location</a:t>
+              <a:t>Our goal is to understand the terms:</a:t>
             </a:r>
           </a:p>
           <a:p>
             <a:pPr lvl="1"/>
             <a:r>
               <a:rPr lang="en-US" dirty="0"/>
-              <a:t>Every identifier has a type:</a:t>
-            </a:r>
-          </a:p>
-          <a:p>
-            <a:pPr lvl="2"/>
-            <a:r>
-              <a:rPr lang="en-US" dirty="0">
-                <a:latin typeface="Consolas" panose="020B0609020204030204" pitchFamily="49" charset="0"/>
-              </a:rPr>
-              <a:t>let k : i32 = 42;</a:t>
-            </a:r>
-          </a:p>
-          <a:p>
-            <a:pPr lvl="2"/>
-            <a:r>
-              <a:rPr lang="en-US" dirty="0"/>
-              <a:t>let signifies a binding is being created</a:t>
-            </a:r>
-          </a:p>
-          <a:p>
-            <a:pPr lvl="2"/>
-            <a:r>
-              <a:rPr lang="en-US" dirty="0">
-                <a:latin typeface="Consolas" panose="020B0609020204030204" pitchFamily="49" charset="0"/>
-              </a:rPr>
-              <a:t>I32</a:t>
-            </a:r>
-            <a:r>
-              <a:rPr lang="en-US" dirty="0"/>
-              <a:t> is the type of a 32 bit integer</a:t>
-            </a:r>
-          </a:p>
-          <a:p>
-            <a:pPr lvl="2"/>
-            <a:r>
-              <a:rPr lang="en-US" dirty="0"/>
-              <a:t>42 is a value placed in the memory location associated with k</a:t>
+              <a:t>Bind – associate an identifier with a value</a:t>
             </a:r>
           </a:p>
           <a:p>
             <a:pPr lvl="1"/>
             <a:r>
               <a:rPr lang="en-US" dirty="0"/>
-              <a:t>A type is a set of legal values with associated operations.</a:t>
+              <a:t>Copy – bind to a copy of a Copy type</a:t>
             </a:r>
           </a:p>
           <a:p>
             <a:pPr lvl="1"/>
             <a:r>
               <a:rPr lang="en-US" dirty="0"/>
-              <a:t>Type inference:</a:t>
-            </a:r>
-          </a:p>
-          <a:p>
-            <a:pPr lvl="2"/>
-            <a:r>
-              <a:rPr lang="en-US" dirty="0">
-                <a:latin typeface="Consolas" panose="020B0609020204030204" pitchFamily="49" charset="0"/>
-              </a:rPr>
-              <a:t>let k = 42; </a:t>
-            </a:r>
-          </a:p>
-          <a:p>
-            <a:pPr lvl="2"/>
-            <a:r>
-              <a:rPr lang="en-US" dirty="0"/>
-              <a:t>This binding is legal and has the same meaning as the previous binding.</a:t>
-            </a:r>
-          </a:p>
-          <a:p>
-            <a:pPr lvl="2"/>
-            <a:r>
-              <a:rPr lang="en-US" dirty="0"/>
-              <a:t>In lieu of other information, Rust will assign the type </a:t>
-            </a:r>
-            <a:r>
-              <a:rPr lang="en-US" dirty="0">
-                <a:latin typeface="Consolas" panose="020B0609020204030204" pitchFamily="49" charset="0"/>
-              </a:rPr>
-              <a:t>i32</a:t>
-            </a:r>
-            <a:r>
-              <a:rPr lang="en-US" dirty="0"/>
-              <a:t> to any integral value that can be correctly written to a 32 bit location.</a:t>
-            </a:r>
-          </a:p>
-        </p:txBody>
-      </p:sp>
-      <p:sp>
-        <p:nvSpPr>
-          <p:cNvPr id="4" name="Slide Number Placeholder 3">
-            <a:extLst>
-              <a:ext uri="{FF2B5EF4-FFF2-40B4-BE49-F238E27FC236}">
-                <a16:creationId xmlns:a16="http://schemas.microsoft.com/office/drawing/2014/main" id="{8046E312-D75C-4207-80C5-8A6BC661A10E}"/>
-              </a:ext>
-            </a:extLst>
-          </p:cNvPr>
-          <p:cNvSpPr>
-            <a:spLocks noGrp="1"/>
-          </p:cNvSpPr>
-          <p:nvPr>
-            <p:ph type="sldNum" sz="quarter" idx="12"/>
-          </p:nvPr>
-        </p:nvSpPr>
-        <p:spPr/>
-        <p:txBody>
-          <a:bodyPr/>
-          <a:lstStyle/>
-          <a:p>
-            <a:fld id="{18FB5E7C-3A32-495C-8F65-DCFD1AE188CA}" type="slidenum">
-              <a:rPr lang="en-US" smtClean="0"/>
-              <a:t>4</a:t>
-            </a:fld>
-            <a:endParaRPr lang="en-US"/>
+              <a:t>Move – transfer ownership of a value</a:t>
+            </a:r>
+          </a:p>
+          <a:p>
+            <a:pPr lvl="1"/>
+            <a:r>
+              <a:rPr lang="en-US" dirty="0"/>
+              <a:t>Clone – make a clone of a !Copy type</a:t>
+            </a:r>
           </a:p>
         </p:txBody>
       </p:sp>
     </p:spTree>
     <p:extLst>
       <p:ext uri="{BB962C8B-B14F-4D97-AF65-F5344CB8AC3E}">
-        <p14:creationId xmlns:p14="http://schemas.microsoft.com/office/powerpoint/2010/main" val="2798764758"/>
+        <p14:creationId xmlns:p14="http://schemas.microsoft.com/office/powerpoint/2010/main" val="400171579"/>
       </p:ext>
     </p:extLst>
   </p:cSld>
@@ -4300,7 +3933,7 @@
           <p:cNvPr id="2" name="Title 1">
             <a:extLst>
               <a:ext uri="{FF2B5EF4-FFF2-40B4-BE49-F238E27FC236}">
-                <a16:creationId xmlns:a16="http://schemas.microsoft.com/office/drawing/2014/main" id="{45BA9A27-5DBD-45F1-817C-8689100FE808}"/>
+                <a16:creationId xmlns:a16="http://schemas.microsoft.com/office/drawing/2014/main" id="{A00843C5-EA74-48F5-A408-471881062CCD}"/>
               </a:ext>
             </a:extLst>
           </p:cNvPr>
@@ -4318,7 +3951,7 @@
           <a:p>
             <a:r>
               <a:rPr lang="en-US" dirty="0"/>
-              <a:t>Bite #1 – Binding to an identifier</a:t>
+              <a:t>Bite #1 – Binding to a value</a:t>
             </a:r>
           </a:p>
         </p:txBody>
@@ -4328,7 +3961,7 @@
           <p:cNvPr id="3" name="Content Placeholder 2">
             <a:extLst>
               <a:ext uri="{FF2B5EF4-FFF2-40B4-BE49-F238E27FC236}">
-                <a16:creationId xmlns:a16="http://schemas.microsoft.com/office/drawing/2014/main" id="{C9DD7204-7B74-4B5D-A3EC-497809D78976}"/>
+                <a16:creationId xmlns:a16="http://schemas.microsoft.com/office/drawing/2014/main" id="{05B05327-6881-4B3B-9A98-BA36132F44F5}"/>
               </a:ext>
             </a:extLst>
           </p:cNvPr>
@@ -4346,170 +3979,105 @@
           <a:p>
             <a:r>
               <a:rPr lang="en-US" dirty="0"/>
-              <a:t>Binding to an identifier has several forms:</a:t>
+              <a:t>Bind – associating an identifier with a memory location</a:t>
             </a:r>
           </a:p>
           <a:p>
             <a:pPr lvl="1"/>
             <a:r>
-              <a:rPr lang="en-US" sz="2000" dirty="0">
+              <a:rPr lang="en-US" dirty="0"/>
+              <a:t>Every identifier has a type:</a:t>
+            </a:r>
+          </a:p>
+          <a:p>
+            <a:pPr lvl="2"/>
+            <a:r>
+              <a:rPr lang="en-US" dirty="0">
                 <a:latin typeface="Consolas" panose="020B0609020204030204" pitchFamily="49" charset="0"/>
               </a:rPr>
-              <a:t>let j:i32 = k;  // makes copy because k is blittable</a:t>
-            </a:r>
-          </a:p>
-          <a:p>
-            <a:pPr lvl="1"/>
-            <a:r>
-              <a:rPr lang="en-US" sz="2000" dirty="0">
+              <a:t>let k : i32 = 42;</a:t>
+            </a:r>
+          </a:p>
+          <a:p>
+            <a:pPr lvl="2"/>
+            <a:r>
+              <a:rPr lang="en-US" dirty="0"/>
+              <a:t>let signifies a binding is being created</a:t>
+            </a:r>
+          </a:p>
+          <a:p>
+            <a:pPr lvl="2"/>
+            <a:r>
+              <a:rPr lang="en-US" dirty="0">
                 <a:latin typeface="Consolas" panose="020B0609020204030204" pitchFamily="49" charset="0"/>
               </a:rPr>
-              <a:t>let l = &amp;k;	 // l makes reference to k, called a borrow</a:t>
+              <a:t>I32</a:t>
+            </a:r>
+            <a:r>
+              <a:rPr lang="en-US" dirty="0"/>
+              <a:t> is the type of a 32 bit integer</a:t>
+            </a:r>
+          </a:p>
+          <a:p>
+            <a:pPr lvl="2"/>
+            <a:r>
+              <a:rPr lang="en-US" dirty="0"/>
+              <a:t>42 is a value placed in the memory location associated with k</a:t>
             </a:r>
           </a:p>
           <a:p>
             <a:pPr lvl="1"/>
             <a:r>
-              <a:rPr lang="en-US" sz="2000" dirty="0">
+              <a:rPr lang="en-US" dirty="0"/>
+              <a:t>A type is a set of legal values with associated operations.</a:t>
+            </a:r>
+          </a:p>
+          <a:p>
+            <a:pPr lvl="1"/>
+            <a:r>
+              <a:rPr lang="en-US" dirty="0"/>
+              <a:t>Type inference:</a:t>
+            </a:r>
+          </a:p>
+          <a:p>
+            <a:pPr lvl="2"/>
+            <a:r>
+              <a:rPr lang="en-US" dirty="0">
                 <a:latin typeface="Consolas" panose="020B0609020204030204" pitchFamily="49" charset="0"/>
               </a:rPr>
-              <a:t>let s:String = “a string”.</a:t>
-            </a:r>
-            <a:r>
-              <a:rPr lang="en-US" sz="2000" dirty="0" err="1">
+              <a:t>let k = 42; </a:t>
+            </a:r>
+          </a:p>
+          <a:p>
+            <a:pPr lvl="2"/>
+            <a:r>
+              <a:rPr lang="en-US" dirty="0"/>
+              <a:t>This binding is legal and has the same meaning as the previous binding.</a:t>
+            </a:r>
+          </a:p>
+          <a:p>
+            <a:pPr lvl="2"/>
+            <a:r>
+              <a:rPr lang="en-US" dirty="0"/>
+              <a:t>In lieu of other information, Rust will assign the type </a:t>
+            </a:r>
+            <a:r>
+              <a:rPr lang="en-US" dirty="0">
                 <a:latin typeface="Consolas" panose="020B0609020204030204" pitchFamily="49" charset="0"/>
               </a:rPr>
-              <a:t>into_string</a:t>
-            </a:r>
-            <a:r>
-              <a:rPr lang="en-US" sz="2000" dirty="0">
-                <a:latin typeface="Consolas" panose="020B0609020204030204" pitchFamily="49" charset="0"/>
-              </a:rPr>
-              <a:t>();</a:t>
-            </a:r>
-          </a:p>
-          <a:p>
-            <a:pPr lvl="1"/>
-            <a:r>
-              <a:rPr lang="en-US" sz="2000" dirty="0">
-                <a:latin typeface="Consolas" panose="020B0609020204030204" pitchFamily="49" charset="0"/>
-              </a:rPr>
-              <a:t>let t = s;	 // moves s into t, e.g., transfers ownership</a:t>
-            </a:r>
-            <a:br>
-              <a:rPr lang="en-US" sz="2000" dirty="0">
-                <a:latin typeface="Consolas" panose="020B0609020204030204" pitchFamily="49" charset="0"/>
-              </a:rPr>
-            </a:br>
-            <a:r>
-              <a:rPr lang="en-US" sz="2000" dirty="0">
-                <a:latin typeface="Consolas" panose="020B0609020204030204" pitchFamily="49" charset="0"/>
-              </a:rPr>
-              <a:t> 			 // because s is not blittable</a:t>
-            </a:r>
-            <a:br>
-              <a:rPr lang="en-US" sz="2000" dirty="0">
-                <a:latin typeface="Consolas" panose="020B0609020204030204" pitchFamily="49" charset="0"/>
-              </a:rPr>
-            </a:br>
-            <a:endParaRPr lang="en-US" sz="2000" dirty="0">
-              <a:latin typeface="Consolas" panose="020B0609020204030204" pitchFamily="49" charset="0"/>
-            </a:endParaRPr>
-          </a:p>
-          <a:p>
-            <a:r>
-              <a:rPr lang="en-US" sz="2400" dirty="0">
-                <a:latin typeface="Consolas" panose="020B0609020204030204" pitchFamily="49" charset="0"/>
-              </a:rPr>
-              <a:t>Blittable</a:t>
-            </a:r>
-          </a:p>
-          <a:p>
-            <a:pPr lvl="1"/>
-            <a:r>
-              <a:rPr lang="en-US" sz="2000" dirty="0">
-                <a:latin typeface="Consolas" panose="020B0609020204030204" pitchFamily="49" charset="0"/>
-              </a:rPr>
-              <a:t>A blittable type occupies a single contiguous block of memory, and so can be correctly copied to a new location with a single </a:t>
-            </a:r>
-            <a:r>
-              <a:rPr lang="en-US" sz="2000" dirty="0" err="1">
-                <a:latin typeface="Consolas" panose="020B0609020204030204" pitchFamily="49" charset="0"/>
-              </a:rPr>
-              <a:t>memcpy</a:t>
-            </a:r>
-            <a:r>
-              <a:rPr lang="en-US" sz="2000" dirty="0">
-                <a:latin typeface="Consolas" panose="020B0609020204030204" pitchFamily="49" charset="0"/>
-              </a:rPr>
-              <a:t>.</a:t>
-            </a:r>
-          </a:p>
-          <a:p>
-            <a:pPr lvl="1"/>
-            <a:r>
-              <a:rPr lang="en-US" sz="2000" dirty="0">
-                <a:latin typeface="Consolas" panose="020B0609020204030204" pitchFamily="49" charset="0"/>
-              </a:rPr>
-              <a:t>Non-blittable types occupy more than one memory location, usually one contiguous block on the stack and possibly one block on the heap.</a:t>
-            </a:r>
-          </a:p>
-          <a:p>
-            <a:pPr lvl="2"/>
-            <a:r>
-              <a:rPr lang="en-US" sz="1600" dirty="0">
-                <a:latin typeface="Consolas" panose="020B0609020204030204" pitchFamily="49" charset="0"/>
-              </a:rPr>
-              <a:t>Non-blittable types cannot be successfully copied with a single </a:t>
-            </a:r>
-            <a:r>
-              <a:rPr lang="en-US" sz="1600" dirty="0" err="1">
-                <a:latin typeface="Consolas" panose="020B0609020204030204" pitchFamily="49" charset="0"/>
-              </a:rPr>
-              <a:t>memcpy</a:t>
-            </a:r>
-            <a:r>
-              <a:rPr lang="en-US" sz="1600" dirty="0">
-                <a:latin typeface="Consolas" panose="020B0609020204030204" pitchFamily="49" charset="0"/>
-              </a:rPr>
-              <a:t> operation.</a:t>
-            </a:r>
-          </a:p>
-        </p:txBody>
-      </p:sp>
-      <p:sp>
-        <p:nvSpPr>
-          <p:cNvPr id="4" name="Slide Number Placeholder 3">
-            <a:extLst>
-              <a:ext uri="{FF2B5EF4-FFF2-40B4-BE49-F238E27FC236}">
-                <a16:creationId xmlns:a16="http://schemas.microsoft.com/office/drawing/2014/main" id="{4FFC2FAF-4337-4954-B1F1-395243DED4B7}"/>
-              </a:ext>
-            </a:extLst>
-          </p:cNvPr>
-          <p:cNvSpPr>
-            <a:spLocks noGrp="1"/>
-          </p:cNvSpPr>
-          <p:nvPr>
-            <p:ph type="sldNum" sz="quarter" idx="12"/>
-          </p:nvPr>
-        </p:nvSpPr>
-        <p:spPr/>
-        <p:txBody>
-          <a:bodyPr/>
-          <a:lstStyle/>
-          <a:p>
-            <a:fld id="{18FB5E7C-3A32-495C-8F65-DCFD1AE188CA}" type="slidenum">
-              <a:rPr lang="en-US" smtClean="0"/>
-              <a:t>5</a:t>
-            </a:fld>
-            <a:endParaRPr lang="en-US"/>
+              <a:t>i32</a:t>
+            </a:r>
+            <a:r>
+              <a:rPr lang="en-US" dirty="0"/>
+              <a:t> to any integral value that can be correctly written to a 32 bit location.</a:t>
+            </a:r>
           </a:p>
         </p:txBody>
       </p:sp>
     </p:spTree>
     <p:extLst>
       <p:ext uri="{BB962C8B-B14F-4D97-AF65-F5344CB8AC3E}">
-        <p14:creationId xmlns:p14="http://schemas.microsoft.com/office/powerpoint/2010/main" val="763148159"/>
+        <p14:creationId xmlns:p14="http://schemas.microsoft.com/office/powerpoint/2010/main" val="2798764758"/>
       </p:ext>
     </p:extLst>
   </p:cSld>
@@ -4541,7 +4109,7 @@
           <p:cNvPr id="2" name="Title 1">
             <a:extLst>
               <a:ext uri="{FF2B5EF4-FFF2-40B4-BE49-F238E27FC236}">
-                <a16:creationId xmlns:a16="http://schemas.microsoft.com/office/drawing/2014/main" id="{EE6ECBFE-112A-4502-A0C3-F0340882F4AE}"/>
+                <a16:creationId xmlns:a16="http://schemas.microsoft.com/office/drawing/2014/main" id="{45BA9A27-5DBD-45F1-817C-8689100FE808}"/>
               </a:ext>
             </a:extLst>
           </p:cNvPr>
@@ -4559,7 +4127,7 @@
           <a:p>
             <a:r>
               <a:rPr lang="en-US" dirty="0"/>
-              <a:t>Bite #1 - Ownership</a:t>
+              <a:t>Bite #1 – Binding to an identifier</a:t>
             </a:r>
           </a:p>
         </p:txBody>
@@ -4569,7 +4137,7 @@
           <p:cNvPr id="3" name="Content Placeholder 2">
             <a:extLst>
               <a:ext uri="{FF2B5EF4-FFF2-40B4-BE49-F238E27FC236}">
-                <a16:creationId xmlns:a16="http://schemas.microsoft.com/office/drawing/2014/main" id="{C8089FCC-05AB-42D4-A7AC-7C6903DCE40C}"/>
+                <a16:creationId xmlns:a16="http://schemas.microsoft.com/office/drawing/2014/main" id="{C9DD7204-7B74-4B5D-A3EC-497809D78976}"/>
               </a:ext>
             </a:extLst>
           </p:cNvPr>
@@ -4587,93 +4155,141 @@
           <a:p>
             <a:r>
               <a:rPr lang="en-US" dirty="0"/>
-              <a:t>Ownership in Rust is an interesting concept.</a:t>
+              <a:t>Binding to an identifier has several forms:</a:t>
             </a:r>
           </a:p>
           <a:p>
             <a:pPr lvl="1"/>
             <a:r>
-              <a:rPr lang="en-US" dirty="0"/>
-              <a:t>In Rust, data has one, and only one owner.</a:t>
+              <a:rPr lang="en-US" sz="2000" dirty="0">
+                <a:latin typeface="Consolas" panose="020B0609020204030204" pitchFamily="49" charset="0"/>
+              </a:rPr>
+              <a:t>let j:i32 = k;  // makes copy because k is blittable</a:t>
             </a:r>
           </a:p>
           <a:p>
             <a:pPr lvl="1"/>
             <a:r>
-              <a:rPr lang="en-US" dirty="0"/>
-              <a:t>Ownership can be borrowed or transferred.</a:t>
+              <a:rPr lang="en-US" sz="2000" dirty="0">
+                <a:latin typeface="Consolas" panose="020B0609020204030204" pitchFamily="49" charset="0"/>
+              </a:rPr>
+              <a:t>let l = &amp;k;	 // l makes reference to k, called a borrow</a:t>
             </a:r>
           </a:p>
           <a:p>
             <a:pPr lvl="1"/>
             <a:r>
-              <a:rPr lang="en-US" dirty="0"/>
-              <a:t>There are rules about ownership that we discuss in Bite #2.</a:t>
+              <a:rPr lang="en-US" sz="2000" dirty="0">
+                <a:latin typeface="Consolas" panose="020B0609020204030204" pitchFamily="49" charset="0"/>
+              </a:rPr>
+              <a:t>let s:String = “a string”.</a:t>
+            </a:r>
+            <a:r>
+              <a:rPr lang="en-US" sz="2000" dirty="0" err="1">
+                <a:latin typeface="Consolas" panose="020B0609020204030204" pitchFamily="49" charset="0"/>
+              </a:rPr>
+              <a:t>into_string</a:t>
+            </a:r>
+            <a:r>
+              <a:rPr lang="en-US" sz="2000" dirty="0">
+                <a:latin typeface="Consolas" panose="020B0609020204030204" pitchFamily="49" charset="0"/>
+              </a:rPr>
+              <a:t>();</a:t>
             </a:r>
           </a:p>
           <a:p>
             <a:pPr lvl="1"/>
             <a:r>
-              <a:rPr lang="en-US" dirty="0"/>
-              <a:t>Following Rust’s ownership rules makes Rust code memory-safe.</a:t>
+              <a:rPr lang="en-US" sz="2000" dirty="0">
+                <a:latin typeface="Consolas" panose="020B0609020204030204" pitchFamily="49" charset="0"/>
+              </a:rPr>
+              <a:t>let t = s;	 // moves s into t, e.g., transfers ownership</a:t>
+            </a:r>
+            <a:br>
+              <a:rPr lang="en-US" sz="2000" dirty="0">
+                <a:latin typeface="Consolas" panose="020B0609020204030204" pitchFamily="49" charset="0"/>
+              </a:rPr>
+            </a:br>
+            <a:r>
+              <a:rPr lang="en-US" sz="2000" dirty="0">
+                <a:latin typeface="Consolas" panose="020B0609020204030204" pitchFamily="49" charset="0"/>
+              </a:rPr>
+              <a:t> 			 // because s is not blittable</a:t>
+            </a:r>
+            <a:br>
+              <a:rPr lang="en-US" sz="2000" dirty="0">
+                <a:latin typeface="Consolas" panose="020B0609020204030204" pitchFamily="49" charset="0"/>
+              </a:rPr>
+            </a:br>
+            <a:endParaRPr lang="en-US" sz="2000" dirty="0">
+              <a:latin typeface="Consolas" panose="020B0609020204030204" pitchFamily="49" charset="0"/>
+            </a:endParaRPr>
+          </a:p>
+          <a:p>
+            <a:r>
+              <a:rPr lang="en-US" sz="2400" dirty="0">
+                <a:latin typeface="Consolas" panose="020B0609020204030204" pitchFamily="49" charset="0"/>
+              </a:rPr>
+              <a:t>Blittable</a:t>
             </a:r>
           </a:p>
           <a:p>
             <a:pPr lvl="1"/>
             <a:r>
-              <a:rPr lang="en-US" dirty="0"/>
-              <a:t>The rules also make Rust code free from data races</a:t>
+              <a:rPr lang="en-US" sz="2000" dirty="0">
+                <a:latin typeface="Consolas" panose="020B0609020204030204" pitchFamily="49" charset="0"/>
+              </a:rPr>
+              <a:t>A blittable type occupies a single contiguous block of memory, and so can be correctly copied to a new location with a single </a:t>
+            </a:r>
+            <a:r>
+              <a:rPr lang="en-US" sz="2000" dirty="0" err="1">
+                <a:latin typeface="Consolas" panose="020B0609020204030204" pitchFamily="49" charset="0"/>
+              </a:rPr>
+              <a:t>memcpy</a:t>
+            </a:r>
+            <a:r>
+              <a:rPr lang="en-US" sz="2000" dirty="0">
+                <a:latin typeface="Consolas" panose="020B0609020204030204" pitchFamily="49" charset="0"/>
+              </a:rPr>
+              <a:t>.</a:t>
+            </a:r>
+          </a:p>
+          <a:p>
+            <a:pPr lvl="1"/>
+            <a:r>
+              <a:rPr lang="en-US" sz="2000" dirty="0">
+                <a:latin typeface="Consolas" panose="020B0609020204030204" pitchFamily="49" charset="0"/>
+              </a:rPr>
+              <a:t>Non-blittable types occupy more than one memory location, usually one contiguous block on the stack and possibly one block on the heap.</a:t>
             </a:r>
           </a:p>
           <a:p>
             <a:pPr lvl="2"/>
             <a:r>
-              <a:rPr lang="en-US" dirty="0"/>
-              <a:t>Rust will not compile code that is shared between threads unless it is guarded by a lock.</a:t>
-            </a:r>
-          </a:p>
-          <a:p>
-            <a:pPr lvl="2"/>
-            <a:r>
-              <a:rPr lang="en-US" dirty="0"/>
-              <a:t>That, combined with single-ownership, ensures ordered access to shared data, one thread at a time. </a:t>
-            </a:r>
-          </a:p>
-        </p:txBody>
-      </p:sp>
-      <p:sp>
-        <p:nvSpPr>
-          <p:cNvPr id="4" name="Slide Number Placeholder 3">
-            <a:extLst>
-              <a:ext uri="{FF2B5EF4-FFF2-40B4-BE49-F238E27FC236}">
-                <a16:creationId xmlns:a16="http://schemas.microsoft.com/office/drawing/2014/main" id="{68AEE16A-DF98-4D0E-9570-4542A9AAAFC8}"/>
-              </a:ext>
-            </a:extLst>
-          </p:cNvPr>
-          <p:cNvSpPr>
-            <a:spLocks noGrp="1"/>
-          </p:cNvSpPr>
-          <p:nvPr>
-            <p:ph type="sldNum" sz="quarter" idx="12"/>
-          </p:nvPr>
-        </p:nvSpPr>
-        <p:spPr/>
-        <p:txBody>
-          <a:bodyPr/>
-          <a:lstStyle/>
-          <a:p>
-            <a:fld id="{18FB5E7C-3A32-495C-8F65-DCFD1AE188CA}" type="slidenum">
-              <a:rPr lang="en-US" smtClean="0"/>
-              <a:t>6</a:t>
-            </a:fld>
-            <a:endParaRPr lang="en-US"/>
+              <a:rPr lang="en-US" sz="1600" dirty="0">
+                <a:latin typeface="Consolas" panose="020B0609020204030204" pitchFamily="49" charset="0"/>
+              </a:rPr>
+              <a:t>Non-blittable types cannot be successfully copied with a single </a:t>
+            </a:r>
+            <a:r>
+              <a:rPr lang="en-US" sz="1600" dirty="0" err="1">
+                <a:latin typeface="Consolas" panose="020B0609020204030204" pitchFamily="49" charset="0"/>
+              </a:rPr>
+              <a:t>memcpy</a:t>
+            </a:r>
+            <a:r>
+              <a:rPr lang="en-US" sz="1600" dirty="0">
+                <a:latin typeface="Consolas" panose="020B0609020204030204" pitchFamily="49" charset="0"/>
+              </a:rPr>
+              <a:t> operation.</a:t>
+            </a:r>
           </a:p>
         </p:txBody>
       </p:sp>
     </p:spTree>
     <p:extLst>
       <p:ext uri="{BB962C8B-B14F-4D97-AF65-F5344CB8AC3E}">
-        <p14:creationId xmlns:p14="http://schemas.microsoft.com/office/powerpoint/2010/main" val="3436325856"/>
+        <p14:creationId xmlns:p14="http://schemas.microsoft.com/office/powerpoint/2010/main" val="763148159"/>
       </p:ext>
     </p:extLst>
   </p:cSld>
@@ -4705,7 +4321,7 @@
           <p:cNvPr id="2" name="Title 1">
             <a:extLst>
               <a:ext uri="{FF2B5EF4-FFF2-40B4-BE49-F238E27FC236}">
-                <a16:creationId xmlns:a16="http://schemas.microsoft.com/office/drawing/2014/main" id="{DD93A7AE-A338-423D-B60E-2DEB9B0D4E44}"/>
+                <a16:creationId xmlns:a16="http://schemas.microsoft.com/office/drawing/2014/main" id="{EE6ECBFE-112A-4502-A0C3-F0340882F4AE}"/>
               </a:ext>
             </a:extLst>
           </p:cNvPr>
@@ -4723,7 +4339,7 @@
           <a:p>
             <a:r>
               <a:rPr lang="en-US" dirty="0"/>
-              <a:t>Bite #1 – Copy and Borrow</a:t>
+              <a:t>Bite #1 - Ownership</a:t>
             </a:r>
           </a:p>
         </p:txBody>
@@ -4733,7 +4349,7 @@
           <p:cNvPr id="3" name="Content Placeholder 2">
             <a:extLst>
               <a:ext uri="{FF2B5EF4-FFF2-40B4-BE49-F238E27FC236}">
-                <a16:creationId xmlns:a16="http://schemas.microsoft.com/office/drawing/2014/main" id="{36A66C96-71A1-4321-B63F-D1EC6AC84296}"/>
+                <a16:creationId xmlns:a16="http://schemas.microsoft.com/office/drawing/2014/main" id="{C8089FCC-05AB-42D4-A7AC-7C6903DCE40C}"/>
               </a:ext>
             </a:extLst>
           </p:cNvPr>
@@ -4751,103 +4367,64 @@
           <a:p>
             <a:r>
               <a:rPr lang="en-US" dirty="0"/>
-              <a:t>A copy operation can occur only for values that satisfy the Copy trait.</a:t>
+              <a:t>Ownership in Rust is an interesting concept.</a:t>
             </a:r>
           </a:p>
           <a:p>
             <a:pPr lvl="1"/>
             <a:r>
               <a:rPr lang="en-US" dirty="0"/>
-              <a:t>A trait is, like an interface, a specification of a contract.  Copy contract requires Rust code to copy data with that trait.</a:t>
-            </a:r>
-            <a:endParaRPr lang="en-US" dirty="0">
-              <a:latin typeface="Consolas" panose="020B0609020204030204" pitchFamily="49" charset="0"/>
-            </a:endParaRPr>
+              <a:t>In Rust, data has one, and only one owner.</a:t>
+            </a:r>
           </a:p>
           <a:p>
             <a:pPr lvl="1"/>
             <a:r>
               <a:rPr lang="en-US" dirty="0"/>
-              <a:t>To satisfy Copy, the data must be blittable.</a:t>
+              <a:t>Ownership can be borrowed or transferred.</a:t>
             </a:r>
           </a:p>
           <a:p>
             <a:pPr lvl="1"/>
             <a:r>
               <a:rPr lang="en-US" dirty="0"/>
-              <a:t>Copies happen implicitly when an identifier is bound to a Copy type.</a:t>
+              <a:t>There are rules about ownership that we discuss in Bite #2.</a:t>
+            </a:r>
+          </a:p>
+          <a:p>
+            <a:pPr lvl="1"/>
+            <a:r>
+              <a:rPr lang="en-US" dirty="0"/>
+              <a:t>Following Rust’s ownership rules makes Rust code memory-safe.</a:t>
+            </a:r>
+          </a:p>
+          <a:p>
+            <a:pPr lvl="1"/>
+            <a:r>
+              <a:rPr lang="en-US" dirty="0"/>
+              <a:t>The rules also make Rust code free from data races</a:t>
             </a:r>
           </a:p>
           <a:p>
             <a:pPr lvl="2"/>
             <a:r>
-              <a:rPr lang="en-US" dirty="0">
-                <a:latin typeface="Consolas" panose="020B0609020204030204" pitchFamily="49" charset="0"/>
-              </a:rPr>
-              <a:t>let i = 3;  let j = i;</a:t>
-            </a:r>
-          </a:p>
-          <a:p>
-            <a:r>
-              <a:rPr lang="en-US" dirty="0">
-                <a:latin typeface="Consolas" panose="020B0609020204030204" pitchFamily="49" charset="0"/>
-              </a:rPr>
-              <a:t>Borrows - binding references to other identifiers</a:t>
-            </a:r>
-          </a:p>
-          <a:p>
-            <a:pPr lvl="1"/>
-            <a:r>
-              <a:rPr lang="en-US" dirty="0">
-                <a:latin typeface="Consolas" panose="020B0609020204030204" pitchFamily="49" charset="0"/>
-              </a:rPr>
-              <a:t>A reference is a safe pointer to the bound memory location.</a:t>
+              <a:rPr lang="en-US" dirty="0"/>
+              <a:t>Rust will not compile code that is shared between threads unless it is guarded by a lock.</a:t>
             </a:r>
           </a:p>
           <a:p>
             <a:pPr lvl="2"/>
             <a:r>
-              <a:rPr lang="en-US" dirty="0">
-                <a:latin typeface="Consolas" panose="020B0609020204030204" pitchFamily="49" charset="0"/>
-              </a:rPr>
-              <a:t>let r = &amp;I; </a:t>
-            </a:r>
-          </a:p>
-        </p:txBody>
-      </p:sp>
-      <p:sp>
-        <p:nvSpPr>
-          <p:cNvPr id="4" name="Slide Number Placeholder 3">
-            <a:extLst>
-              <a:ext uri="{FF2B5EF4-FFF2-40B4-BE49-F238E27FC236}">
-                <a16:creationId xmlns:a16="http://schemas.microsoft.com/office/drawing/2014/main" id="{618A4287-D5AB-4DBD-9B38-24D866DA6CD4}"/>
-              </a:ext>
-            </a:extLst>
-          </p:cNvPr>
-          <p:cNvSpPr>
-            <a:spLocks noGrp="1"/>
-          </p:cNvSpPr>
-          <p:nvPr>
-            <p:ph type="sldNum" sz="quarter" idx="12"/>
-          </p:nvPr>
-        </p:nvSpPr>
-        <p:spPr/>
-        <p:txBody>
-          <a:bodyPr/>
-          <a:lstStyle/>
-          <a:p>
-            <a:fld id="{18FB5E7C-3A32-495C-8F65-DCFD1AE188CA}" type="slidenum">
-              <a:rPr lang="en-US" smtClean="0"/>
-              <a:t>7</a:t>
-            </a:fld>
-            <a:endParaRPr lang="en-US"/>
+              <a:rPr lang="en-US" dirty="0"/>
+              <a:t>That, combined with single-ownership, ensures ordered access to shared data, one thread at a time. </a:t>
+            </a:r>
           </a:p>
         </p:txBody>
       </p:sp>
     </p:spTree>
     <p:extLst>
       <p:ext uri="{BB962C8B-B14F-4D97-AF65-F5344CB8AC3E}">
-        <p14:creationId xmlns:p14="http://schemas.microsoft.com/office/powerpoint/2010/main" val="1594759476"/>
+        <p14:creationId xmlns:p14="http://schemas.microsoft.com/office/powerpoint/2010/main" val="3436325856"/>
       </p:ext>
     </p:extLst>
   </p:cSld>
@@ -4879,7 +4456,7 @@
           <p:cNvPr id="2" name="Title 1">
             <a:extLst>
               <a:ext uri="{FF2B5EF4-FFF2-40B4-BE49-F238E27FC236}">
-                <a16:creationId xmlns:a16="http://schemas.microsoft.com/office/drawing/2014/main" id="{72D9AD15-3145-48ED-8FFA-201AF201B1C8}"/>
+                <a16:creationId xmlns:a16="http://schemas.microsoft.com/office/drawing/2014/main" id="{DD93A7AE-A338-423D-B60E-2DEB9B0D4E44}"/>
               </a:ext>
             </a:extLst>
           </p:cNvPr>
@@ -4897,251 +4474,102 @@
           <a:p>
             <a:r>
               <a:rPr lang="en-US" dirty="0"/>
-              <a:t>Bite #1 – Move and Clone</a:t>
-            </a:r>
-          </a:p>
-        </p:txBody>
-      </p:sp>
-      <p:pic>
-        <p:nvPicPr>
-          <p:cNvPr id="5" name="Content Placeholder 4" descr="A screenshot of a cell phone&#10;&#10;Description automatically generated">
-            <a:extLst>
-              <a:ext uri="{FF2B5EF4-FFF2-40B4-BE49-F238E27FC236}">
-                <a16:creationId xmlns:a16="http://schemas.microsoft.com/office/drawing/2014/main" id="{8D4D2D88-8800-44EA-9070-21F256F1500C}"/>
-              </a:ext>
-            </a:extLst>
-          </p:cNvPr>
-          <p:cNvPicPr>
-            <a:picLocks noGrp="1" noChangeAspect="1"/>
-          </p:cNvPicPr>
+              <a:t>Bite #1 – Copy and Borrow</a:t>
+            </a:r>
+          </a:p>
+        </p:txBody>
+      </p:sp>
+      <p:sp>
+        <p:nvSpPr>
+          <p:cNvPr id="3" name="Content Placeholder 2">
+            <a:extLst>
+              <a:ext uri="{FF2B5EF4-FFF2-40B4-BE49-F238E27FC236}">
+                <a16:creationId xmlns:a16="http://schemas.microsoft.com/office/drawing/2014/main" id="{36A66C96-71A1-4321-B63F-D1EC6AC84296}"/>
+              </a:ext>
+            </a:extLst>
+          </p:cNvPr>
+          <p:cNvSpPr>
+            <a:spLocks noGrp="1"/>
+          </p:cNvSpPr>
           <p:nvPr>
             <p:ph idx="1"/>
           </p:nvPr>
-        </p:nvPicPr>
-        <p:blipFill>
-          <a:blip r:embed="rId2">
-            <a:extLst>
-              <a:ext uri="{28A0092B-C50C-407E-A947-70E740481C1C}">
-                <a14:useLocalDpi xmlns:a14="http://schemas.microsoft.com/office/drawing/2010/main" val="0"/>
-              </a:ext>
-            </a:extLst>
-          </a:blip>
-          <a:stretch>
-            <a:fillRect/>
-          </a:stretch>
-        </p:blipFill>
-        <p:spPr>
-          <a:xfrm>
-            <a:off x="7337650" y="444754"/>
-            <a:ext cx="3898450" cy="2788801"/>
-          </a:xfrm>
-        </p:spPr>
-      </p:pic>
-      <p:pic>
-        <p:nvPicPr>
-          <p:cNvPr id="7" name="Picture 6" descr="A screenshot of a cell phone&#10;&#10;Description automatically generated">
-            <a:extLst>
-              <a:ext uri="{FF2B5EF4-FFF2-40B4-BE49-F238E27FC236}">
-                <a16:creationId xmlns:a16="http://schemas.microsoft.com/office/drawing/2014/main" id="{9536CF63-797E-427A-809D-F01E69547F2B}"/>
-              </a:ext>
-            </a:extLst>
-          </p:cNvPr>
-          <p:cNvPicPr>
-            <a:picLocks noChangeAspect="1"/>
-          </p:cNvPicPr>
-          <p:nvPr/>
-        </p:nvPicPr>
-        <p:blipFill>
-          <a:blip r:embed="rId3">
-            <a:extLst>
-              <a:ext uri="{28A0092B-C50C-407E-A947-70E740481C1C}">
-                <a14:useLocalDpi xmlns:a14="http://schemas.microsoft.com/office/drawing/2010/main" val="0"/>
-              </a:ext>
-            </a:extLst>
-          </a:blip>
-          <a:stretch>
-            <a:fillRect/>
-          </a:stretch>
-        </p:blipFill>
-        <p:spPr>
-          <a:xfrm>
-            <a:off x="7290751" y="3313183"/>
-            <a:ext cx="3992248" cy="2860118"/>
-          </a:xfrm>
-          <a:prstGeom prst="rect">
-            <a:avLst/>
-          </a:prstGeom>
-        </p:spPr>
-      </p:pic>
-      <p:sp>
-        <p:nvSpPr>
-          <p:cNvPr id="8" name="TextBox 7">
-            <a:extLst>
-              <a:ext uri="{FF2B5EF4-FFF2-40B4-BE49-F238E27FC236}">
-                <a16:creationId xmlns:a16="http://schemas.microsoft.com/office/drawing/2014/main" id="{6237F669-E42A-487D-8D15-3F3243539AE6}"/>
-              </a:ext>
-            </a:extLst>
-          </p:cNvPr>
-          <p:cNvSpPr txBox="1"/>
-          <p:nvPr/>
-        </p:nvSpPr>
-        <p:spPr>
-          <a:xfrm>
-            <a:off x="893460" y="1277368"/>
-            <a:ext cx="6326490" cy="4685898"/>
-          </a:xfrm>
-          <a:prstGeom prst="rect">
-            <a:avLst/>
-          </a:prstGeom>
-          <a:noFill/>
-        </p:spPr>
-        <p:txBody>
-          <a:bodyPr wrap="square" rtlCol="0">
-            <a:spAutoFit/>
-          </a:bodyPr>
-          <a:lstStyle/>
-          <a:p>
-            <a:pPr marL="342900" indent="-342900">
-              <a:buFont typeface="Arial" panose="020B0604020202020204" pitchFamily="34" charset="0"/>
-              <a:buChar char="•"/>
-            </a:pPr>
-            <a:r>
-              <a:rPr lang="en-US" sz="2400" dirty="0"/>
-              <a:t>A move transfers a Move type’s heap resources to another instance of that type</a:t>
-            </a:r>
-          </a:p>
-          <a:p>
-            <a:pPr marL="800100" lvl="1" indent="-342900">
-              <a:buFont typeface="Arial" panose="020B0604020202020204" pitchFamily="34" charset="0"/>
-              <a:buChar char="•"/>
-            </a:pPr>
-            <a:r>
-              <a:rPr lang="en-US" sz="2400" dirty="0"/>
-              <a:t>The string, s, shown in the top diagram is moved to t with the statement:</a:t>
-            </a:r>
-          </a:p>
-          <a:p>
-            <a:pPr marL="1257300" lvl="2" indent="-342900">
-              <a:buFont typeface="Arial" panose="020B0604020202020204" pitchFamily="34" charset="0"/>
-              <a:buChar char="•"/>
-            </a:pPr>
-            <a:r>
-              <a:rPr lang="en-US" sz="2000" dirty="0">
+        </p:nvSpPr>
+        <p:spPr/>
+        <p:txBody>
+          <a:bodyPr/>
+          <a:lstStyle/>
+          <a:p>
+            <a:r>
+              <a:rPr lang="en-US" dirty="0"/>
+              <a:t>A copy operation can occur only for values that satisfy the Copy trait.</a:t>
+            </a:r>
+          </a:p>
+          <a:p>
+            <a:pPr lvl="1"/>
+            <a:r>
+              <a:rPr lang="en-US" dirty="0"/>
+              <a:t>A trait is, like an interface, a specification of a contract.  Copy contract requires Rust code to copy data with that trait.</a:t>
+            </a:r>
+            <a:endParaRPr lang="en-US" dirty="0">
+              <a:latin typeface="Consolas" panose="020B0609020204030204" pitchFamily="49" charset="0"/>
+            </a:endParaRPr>
+          </a:p>
+          <a:p>
+            <a:pPr lvl="1"/>
+            <a:r>
+              <a:rPr lang="en-US" dirty="0"/>
+              <a:t>To satisfy Copy, the data must be blittable.</a:t>
+            </a:r>
+          </a:p>
+          <a:p>
+            <a:pPr lvl="1"/>
+            <a:r>
+              <a:rPr lang="en-US" dirty="0"/>
+              <a:t>Copies happen implicitly when an identifier is bound to a Copy type.</a:t>
+            </a:r>
+          </a:p>
+          <a:p>
+            <a:pPr lvl="2"/>
+            <a:r>
+              <a:rPr lang="en-US" dirty="0">
                 <a:latin typeface="Consolas" panose="020B0609020204030204" pitchFamily="49" charset="0"/>
               </a:rPr>
-              <a:t>let t = s;</a:t>
-            </a:r>
-          </a:p>
-          <a:p>
-            <a:pPr marL="800100" lvl="1" indent="-342900">
-              <a:buFont typeface="Arial" panose="020B0604020202020204" pitchFamily="34" charset="0"/>
-              <a:buChar char="•"/>
-            </a:pPr>
-            <a:r>
-              <a:rPr lang="en-US" sz="2400" dirty="0"/>
-              <a:t>Move transfers ownership of resources.</a:t>
-            </a:r>
-            <a:br>
-              <a:rPr lang="en-US" sz="2400" dirty="0"/>
-            </a:br>
-            <a:endParaRPr lang="en-US" sz="1050" dirty="0"/>
-          </a:p>
-          <a:p>
-            <a:pPr marL="342900" indent="-342900">
-              <a:buFont typeface="Arial" panose="020B0604020202020204" pitchFamily="34" charset="0"/>
-              <a:buChar char="•"/>
-            </a:pPr>
-            <a:r>
-              <a:rPr lang="en-US" sz="2400" dirty="0"/>
-              <a:t>A clone copies a Move type’s heap resources</a:t>
-            </a:r>
-            <a:br>
-              <a:rPr lang="en-US" sz="2400" dirty="0"/>
-            </a:br>
-            <a:r>
-              <a:rPr lang="en-US" sz="2400" dirty="0"/>
-              <a:t>to a new instance of that type.</a:t>
-            </a:r>
-          </a:p>
-          <a:p>
-            <a:pPr marL="800100" lvl="1" indent="-342900">
-              <a:buFont typeface="Arial" panose="020B0604020202020204" pitchFamily="34" charset="0"/>
-              <a:buChar char="•"/>
-            </a:pPr>
-            <a:r>
-              <a:rPr lang="en-US" sz="2400" dirty="0"/>
-              <a:t>The string s, shown in the bottom diagram is cloned with the statement:</a:t>
-            </a:r>
-          </a:p>
-          <a:p>
-            <a:pPr marL="1257300" lvl="2" indent="-342900">
-              <a:buFont typeface="Arial" panose="020B0604020202020204" pitchFamily="34" charset="0"/>
-              <a:buChar char="•"/>
-            </a:pPr>
-            <a:r>
-              <a:rPr lang="en-US" sz="2000" dirty="0">
+              <a:t>let i = 3;  let j = i;</a:t>
+            </a:r>
+          </a:p>
+          <a:p>
+            <a:r>
+              <a:rPr lang="en-US" dirty="0">
                 <a:latin typeface="Consolas" panose="020B0609020204030204" pitchFamily="49" charset="0"/>
               </a:rPr>
-              <a:t>let t = </a:t>
-            </a:r>
-            <a:r>
-              <a:rPr lang="en-US" sz="2000" dirty="0" err="1">
+              <a:t>Borrows - binding references to other identifiers</a:t>
+            </a:r>
+          </a:p>
+          <a:p>
+            <a:pPr lvl="1"/>
+            <a:r>
+              <a:rPr lang="en-US" dirty="0">
                 <a:latin typeface="Consolas" panose="020B0609020204030204" pitchFamily="49" charset="0"/>
               </a:rPr>
-              <a:t>s.clone</a:t>
-            </a:r>
-            <a:r>
-              <a:rPr lang="en-US" sz="2000" dirty="0">
+              <a:t>A reference is a safe pointer to the bound memory location.</a:t>
+            </a:r>
+          </a:p>
+          <a:p>
+            <a:pPr lvl="2"/>
+            <a:r>
+              <a:rPr lang="en-US" dirty="0">
                 <a:latin typeface="Consolas" panose="020B0609020204030204" pitchFamily="49" charset="0"/>
               </a:rPr>
-              <a:t>();</a:t>
-            </a:r>
-          </a:p>
-          <a:p>
-            <a:pPr marL="800100" lvl="1" indent="-342900">
-              <a:buFont typeface="Arial" panose="020B0604020202020204" pitchFamily="34" charset="0"/>
-              <a:buChar char="•"/>
-            </a:pPr>
-            <a:r>
-              <a:rPr lang="en-US" sz="2400" dirty="0"/>
-              <a:t>Clone copies resources to the target.</a:t>
-            </a:r>
-          </a:p>
-        </p:txBody>
-      </p:sp>
-      <p:sp>
-        <p:nvSpPr>
-          <p:cNvPr id="9" name="Slide Number Placeholder 8">
-            <a:extLst>
-              <a:ext uri="{FF2B5EF4-FFF2-40B4-BE49-F238E27FC236}">
-                <a16:creationId xmlns:a16="http://schemas.microsoft.com/office/drawing/2014/main" id="{A848CBCD-04D3-431F-B41C-8FBA6C0E0D83}"/>
-              </a:ext>
-            </a:extLst>
-          </p:cNvPr>
-          <p:cNvSpPr>
-            <a:spLocks noGrp="1"/>
-          </p:cNvSpPr>
-          <p:nvPr>
-            <p:ph type="sldNum" sz="quarter" idx="12"/>
-          </p:nvPr>
-        </p:nvSpPr>
-        <p:spPr/>
-        <p:txBody>
-          <a:bodyPr/>
-          <a:lstStyle/>
-          <a:p>
-            <a:fld id="{18FB5E7C-3A32-495C-8F65-DCFD1AE188CA}" type="slidenum">
-              <a:rPr lang="en-US" smtClean="0"/>
-              <a:t>8</a:t>
-            </a:fld>
-            <a:endParaRPr lang="en-US"/>
+              <a:t>let r = &amp;I; </a:t>
+            </a:r>
           </a:p>
         </p:txBody>
       </p:sp>
     </p:spTree>
     <p:extLst>
       <p:ext uri="{BB962C8B-B14F-4D97-AF65-F5344CB8AC3E}">
-        <p14:creationId xmlns:p14="http://schemas.microsoft.com/office/powerpoint/2010/main" val="3565984247"/>
+        <p14:creationId xmlns:p14="http://schemas.microsoft.com/office/powerpoint/2010/main" val="1594759476"/>
       </p:ext>
     </p:extLst>
   </p:cSld>
@@ -5170,18 +4598,18 @@
       </p:grpSpPr>
       <p:sp>
         <p:nvSpPr>
-          <p:cNvPr id="4" name="Title 3">
-            <a:extLst>
-              <a:ext uri="{FF2B5EF4-FFF2-40B4-BE49-F238E27FC236}">
-                <a16:creationId xmlns:a16="http://schemas.microsoft.com/office/drawing/2014/main" id="{4477C225-3FB8-4B6F-BCF4-9991307C198B}"/>
-              </a:ext>
-            </a:extLst>
-          </p:cNvPr>
-          <p:cNvSpPr>
-            <a:spLocks noGrp="1"/>
-          </p:cNvSpPr>
-          <p:nvPr>
-            <p:ph type="ctrTitle"/>
+          <p:cNvPr id="2" name="Title 1">
+            <a:extLst>
+              <a:ext uri="{FF2B5EF4-FFF2-40B4-BE49-F238E27FC236}">
+                <a16:creationId xmlns:a16="http://schemas.microsoft.com/office/drawing/2014/main" id="{72D9AD15-3145-48ED-8FFA-201AF201B1C8}"/>
+              </a:ext>
+            </a:extLst>
+          </p:cNvPr>
+          <p:cNvSpPr>
+            <a:spLocks noGrp="1"/>
+          </p:cNvSpPr>
+          <p:nvPr>
+            <p:ph type="title"/>
           </p:nvPr>
         </p:nvSpPr>
         <p:spPr/>
@@ -5191,7 +4619,214 @@
           <a:p>
             <a:r>
               <a:rPr lang="en-US" dirty="0"/>
-              <a:t>That’s all until Bite #2</a:t>
+              <a:t>Bite #1 – Move and Clone</a:t>
+            </a:r>
+          </a:p>
+        </p:txBody>
+      </p:sp>
+      <p:pic>
+        <p:nvPicPr>
+          <p:cNvPr id="5" name="Content Placeholder 4" descr="A screenshot of a cell phone&#10;&#10;Description automatically generated">
+            <a:extLst>
+              <a:ext uri="{FF2B5EF4-FFF2-40B4-BE49-F238E27FC236}">
+                <a16:creationId xmlns:a16="http://schemas.microsoft.com/office/drawing/2014/main" id="{8D4D2D88-8800-44EA-9070-21F256F1500C}"/>
+              </a:ext>
+            </a:extLst>
+          </p:cNvPr>
+          <p:cNvPicPr>
+            <a:picLocks noGrp="1" noChangeAspect="1"/>
+          </p:cNvPicPr>
+          <p:nvPr>
+            <p:ph idx="1"/>
+          </p:nvPr>
+        </p:nvPicPr>
+        <p:blipFill>
+          <a:blip r:embed="rId2">
+            <a:extLst>
+              <a:ext uri="{28A0092B-C50C-407E-A947-70E740481C1C}">
+                <a14:useLocalDpi xmlns:a14="http://schemas.microsoft.com/office/drawing/2010/main" val="0"/>
+              </a:ext>
+            </a:extLst>
+          </a:blip>
+          <a:stretch>
+            <a:fillRect/>
+          </a:stretch>
+        </p:blipFill>
+        <p:spPr>
+          <a:xfrm>
+            <a:off x="7337650" y="444754"/>
+            <a:ext cx="3898450" cy="2788801"/>
+          </a:xfrm>
+        </p:spPr>
+      </p:pic>
+      <p:pic>
+        <p:nvPicPr>
+          <p:cNvPr id="7" name="Picture 6" descr="A screenshot of a cell phone&#10;&#10;Description automatically generated">
+            <a:extLst>
+              <a:ext uri="{FF2B5EF4-FFF2-40B4-BE49-F238E27FC236}">
+                <a16:creationId xmlns:a16="http://schemas.microsoft.com/office/drawing/2014/main" id="{9536CF63-797E-427A-809D-F01E69547F2B}"/>
+              </a:ext>
+            </a:extLst>
+          </p:cNvPr>
+          <p:cNvPicPr>
+            <a:picLocks noChangeAspect="1"/>
+          </p:cNvPicPr>
+          <p:nvPr/>
+        </p:nvPicPr>
+        <p:blipFill>
+          <a:blip r:embed="rId3">
+            <a:extLst>
+              <a:ext uri="{28A0092B-C50C-407E-A947-70E740481C1C}">
+                <a14:useLocalDpi xmlns:a14="http://schemas.microsoft.com/office/drawing/2010/main" val="0"/>
+              </a:ext>
+            </a:extLst>
+          </a:blip>
+          <a:stretch>
+            <a:fillRect/>
+          </a:stretch>
+        </p:blipFill>
+        <p:spPr>
+          <a:xfrm>
+            <a:off x="7290751" y="3313183"/>
+            <a:ext cx="3992248" cy="2860118"/>
+          </a:xfrm>
+          <a:prstGeom prst="rect">
+            <a:avLst/>
+          </a:prstGeom>
+        </p:spPr>
+      </p:pic>
+      <p:sp>
+        <p:nvSpPr>
+          <p:cNvPr id="8" name="TextBox 7">
+            <a:extLst>
+              <a:ext uri="{FF2B5EF4-FFF2-40B4-BE49-F238E27FC236}">
+                <a16:creationId xmlns:a16="http://schemas.microsoft.com/office/drawing/2014/main" id="{6237F669-E42A-487D-8D15-3F3243539AE6}"/>
+              </a:ext>
+            </a:extLst>
+          </p:cNvPr>
+          <p:cNvSpPr txBox="1"/>
+          <p:nvPr/>
+        </p:nvSpPr>
+        <p:spPr>
+          <a:xfrm>
+            <a:off x="893460" y="1277368"/>
+            <a:ext cx="6326490" cy="4685898"/>
+          </a:xfrm>
+          <a:prstGeom prst="rect">
+            <a:avLst/>
+          </a:prstGeom>
+          <a:noFill/>
+        </p:spPr>
+        <p:txBody>
+          <a:bodyPr wrap="square" rtlCol="0">
+            <a:spAutoFit/>
+          </a:bodyPr>
+          <a:lstStyle/>
+          <a:p>
+            <a:pPr marL="342900" indent="-342900">
+              <a:buFont typeface="Arial" panose="020B0604020202020204" pitchFamily="34" charset="0"/>
+              <a:buChar char="•"/>
+            </a:pPr>
+            <a:r>
+              <a:rPr lang="en-US" sz="2400" dirty="0"/>
+              <a:t>A move transfers a Move type’s heap resources to another instance of that type</a:t>
+            </a:r>
+          </a:p>
+          <a:p>
+            <a:pPr marL="800100" lvl="1" indent="-342900">
+              <a:buFont typeface="Arial" panose="020B0604020202020204" pitchFamily="34" charset="0"/>
+              <a:buChar char="•"/>
+            </a:pPr>
+            <a:r>
+              <a:rPr lang="en-US" sz="2400" dirty="0"/>
+              <a:t>The string, s, shown in the top diagram is moved to t with the statement:</a:t>
+            </a:r>
+          </a:p>
+          <a:p>
+            <a:pPr marL="1257300" lvl="2" indent="-342900">
+              <a:buFont typeface="Arial" panose="020B0604020202020204" pitchFamily="34" charset="0"/>
+              <a:buChar char="•"/>
+            </a:pPr>
+            <a:r>
+              <a:rPr lang="en-US" sz="2000" dirty="0">
+                <a:latin typeface="Consolas" panose="020B0609020204030204" pitchFamily="49" charset="0"/>
+              </a:rPr>
+              <a:t>let t = s;</a:t>
+            </a:r>
+          </a:p>
+          <a:p>
+            <a:pPr marL="800100" lvl="1" indent="-342900">
+              <a:buFont typeface="Arial" panose="020B0604020202020204" pitchFamily="34" charset="0"/>
+              <a:buChar char="•"/>
+            </a:pPr>
+            <a:r>
+              <a:rPr lang="en-US" sz="2400" dirty="0"/>
+              <a:t>Move transfers ownership of resources.</a:t>
+            </a:r>
+            <a:br>
+              <a:rPr lang="en-US" sz="2400" dirty="0"/>
+            </a:br>
+            <a:endParaRPr lang="en-US" sz="1050" dirty="0"/>
+          </a:p>
+          <a:p>
+            <a:pPr marL="342900" indent="-342900">
+              <a:buFont typeface="Arial" panose="020B0604020202020204" pitchFamily="34" charset="0"/>
+              <a:buChar char="•"/>
+            </a:pPr>
+            <a:r>
+              <a:rPr lang="en-US" sz="2400" dirty="0"/>
+              <a:t>A clone copies a Move type’s heap resources</a:t>
+            </a:r>
+            <a:br>
+              <a:rPr lang="en-US" sz="2400" dirty="0"/>
+            </a:br>
+            <a:r>
+              <a:rPr lang="en-US" sz="2400" dirty="0"/>
+              <a:t>to a new instance of that type.</a:t>
+            </a:r>
+          </a:p>
+          <a:p>
+            <a:pPr marL="800100" lvl="1" indent="-342900">
+              <a:buFont typeface="Arial" panose="020B0604020202020204" pitchFamily="34" charset="0"/>
+              <a:buChar char="•"/>
+            </a:pPr>
+            <a:r>
+              <a:rPr lang="en-US" sz="2400" dirty="0"/>
+              <a:t>The string s, shown in the bottom diagram is cloned with the statement:</a:t>
+            </a:r>
+          </a:p>
+          <a:p>
+            <a:pPr marL="1257300" lvl="2" indent="-342900">
+              <a:buFont typeface="Arial" panose="020B0604020202020204" pitchFamily="34" charset="0"/>
+              <a:buChar char="•"/>
+            </a:pPr>
+            <a:r>
+              <a:rPr lang="en-US" sz="2000" dirty="0">
+                <a:latin typeface="Consolas" panose="020B0609020204030204" pitchFamily="49" charset="0"/>
+              </a:rPr>
+              <a:t>let t = </a:t>
+            </a:r>
+            <a:r>
+              <a:rPr lang="en-US" sz="2000" dirty="0" err="1">
+                <a:latin typeface="Consolas" panose="020B0609020204030204" pitchFamily="49" charset="0"/>
+              </a:rPr>
+              <a:t>s.clone</a:t>
+            </a:r>
+            <a:r>
+              <a:rPr lang="en-US" sz="2000" dirty="0">
+                <a:latin typeface="Consolas" panose="020B0609020204030204" pitchFamily="49" charset="0"/>
+              </a:rPr>
+              <a:t>();</a:t>
+            </a:r>
+          </a:p>
+          <a:p>
+            <a:pPr marL="800100" lvl="1" indent="-342900">
+              <a:buFont typeface="Arial" panose="020B0604020202020204" pitchFamily="34" charset="0"/>
+              <a:buChar char="•"/>
+            </a:pPr>
+            <a:r>
+              <a:rPr lang="en-US" sz="2400" dirty="0"/>
+              <a:t>Clone copies resources to the target.</a:t>
             </a:r>
           </a:p>
         </p:txBody>
@@ -5199,7 +4834,7 @@
     </p:spTree>
     <p:extLst>
       <p:ext uri="{BB962C8B-B14F-4D97-AF65-F5344CB8AC3E}">
-        <p14:creationId xmlns:p14="http://schemas.microsoft.com/office/powerpoint/2010/main" val="479660607"/>
+        <p14:creationId xmlns:p14="http://schemas.microsoft.com/office/powerpoint/2010/main" val="3565984247"/>
       </p:ext>
     </p:extLst>
   </p:cSld>
@@ -5502,299 +5137,4 @@
     </a:ext>
   </a:extLst>
 </a:theme>
-</file>
-
-<file path=ppt/theme/theme2.xml><?xml version="1.0" encoding="utf-8"?>
-<a:theme xmlns:a="http://schemas.openxmlformats.org/drawingml/2006/main" name="Office Theme">
-  <a:themeElements>
-    <a:clrScheme name="Office">
-      <a:dk1>
-        <a:sysClr val="windowText" lastClr="000000"/>
-      </a:dk1>
-      <a:lt1>
-        <a:sysClr val="window" lastClr="FFFFFF"/>
-      </a:lt1>
-      <a:dk2>
-        <a:srgbClr val="44546A"/>
-      </a:dk2>
-      <a:lt2>
-        <a:srgbClr val="E7E6E6"/>
-      </a:lt2>
-      <a:accent1>
-        <a:srgbClr val="4472C4"/>
-      </a:accent1>
-      <a:accent2>
-        <a:srgbClr val="ED7D31"/>
-      </a:accent2>
-      <a:accent3>
-        <a:srgbClr val="A5A5A5"/>
-      </a:accent3>
-      <a:accent4>
-        <a:srgbClr val="FFC000"/>
-      </a:accent4>
-      <a:accent5>
-        <a:srgbClr val="5B9BD5"/>
-      </a:accent5>
-      <a:accent6>
-        <a:srgbClr val="70AD47"/>
-      </a:accent6>
-      <a:hlink>
-        <a:srgbClr val="0563C1"/>
-      </a:hlink>
-      <a:folHlink>
-        <a:srgbClr val="954F72"/>
-      </a:folHlink>
-    </a:clrScheme>
-    <a:fontScheme name="Office">
-      <a:majorFont>
-        <a:latin typeface="Calibri Light" panose="020F0302020204030204"/>
-        <a:ea typeface=""/>
-        <a:cs typeface=""/>
-        <a:font script="Jpan" typeface="游ゴシック Light"/>
-        <a:font script="Hang" typeface="맑은 고딕"/>
-        <a:font script="Hans" typeface="等线 Light"/>
-        <a:font script="Hant" typeface="新細明體"/>
-        <a:font script="Arab" typeface="Times New Roman"/>
-        <a:font script="Hebr" typeface="Times New Roman"/>
-        <a:font script="Thai" typeface="Angsana New"/>
-        <a:font script="Ethi" typeface="Nyala"/>
-        <a:font script="Beng" typeface="Vrinda"/>
-        <a:font script="Gujr" typeface="Shruti"/>
-        <a:font script="Khmr" typeface="MoolBoran"/>
-        <a:font script="Knda" typeface="Tunga"/>
-        <a:font script="Guru" typeface="Raavi"/>
-        <a:font script="Cans" typeface="Euphemia"/>
-        <a:font script="Cher" typeface="Plantagenet Cherokee"/>
-        <a:font script="Yiii" typeface="Microsoft Yi Baiti"/>
-        <a:font script="Tibt" typeface="Microsoft Himalaya"/>
-        <a:font script="Thaa" typeface="MV Boli"/>
-        <a:font script="Deva" typeface="Mangal"/>
-        <a:font script="Telu" typeface="Gautami"/>
-        <a:font script="Taml" typeface="Latha"/>
-        <a:font script="Syrc" typeface="Estrangelo Edessa"/>
-        <a:font script="Orya" typeface="Kalinga"/>
-        <a:font script="Mlym" typeface="Kartika"/>
-        <a:font script="Laoo" typeface="DokChampa"/>
-        <a:font script="Sinh" typeface="Iskoola Pota"/>
-        <a:font script="Mong" typeface="Mongolian Baiti"/>
-        <a:font script="Viet" typeface="Times New Roman"/>
-        <a:font script="Uigh" typeface="Microsoft Uighur"/>
-        <a:font script="Geor" typeface="Sylfaen"/>
-        <a:font script="Armn" typeface="Arial"/>
-        <a:font script="Bugi" typeface="Leelawadee UI"/>
-        <a:font script="Bopo" typeface="Microsoft JhengHei"/>
-        <a:font script="Java" typeface="Javanese Text"/>
-        <a:font script="Lisu" typeface="Segoe UI"/>
-        <a:font script="Mymr" typeface="Myanmar Text"/>
-        <a:font script="Nkoo" typeface="Ebrima"/>
-        <a:font script="Olck" typeface="Nirmala UI"/>
-        <a:font script="Osma" typeface="Ebrima"/>
-        <a:font script="Phag" typeface="Phagspa"/>
-        <a:font script="Syrn" typeface="Estrangelo Edessa"/>
-        <a:font script="Syrj" typeface="Estrangelo Edessa"/>
-        <a:font script="Syre" typeface="Estrangelo Edessa"/>
-        <a:font script="Sora" typeface="Nirmala UI"/>
-        <a:font script="Tale" typeface="Microsoft Tai Le"/>
-        <a:font script="Talu" typeface="Microsoft New Tai Lue"/>
-        <a:font script="Tfng" typeface="Ebrima"/>
-      </a:majorFont>
-      <a:minorFont>
-        <a:latin typeface="Calibri" panose="020F0502020204030204"/>
-        <a:ea typeface=""/>
-        <a:cs typeface=""/>
-        <a:font script="Jpan" typeface="游ゴシック"/>
-        <a:font script="Hang" typeface="맑은 고딕"/>
-        <a:font script="Hans" typeface="等线"/>
-        <a:font script="Hant" typeface="新細明體"/>
-        <a:font script="Arab" typeface="Arial"/>
-        <a:font script="Hebr" typeface="Arial"/>
-        <a:font script="Thai" typeface="Cordia New"/>
-        <a:font script="Ethi" typeface="Nyala"/>
-        <a:font script="Beng" typeface="Vrinda"/>
-        <a:font script="Gujr" typeface="Shruti"/>
-        <a:font script="Khmr" typeface="DaunPenh"/>
-        <a:font script="Knda" typeface="Tunga"/>
-        <a:font script="Guru" typeface="Raavi"/>
-        <a:font script="Cans" typeface="Euphemia"/>
-        <a:font script="Cher" typeface="Plantagenet Cherokee"/>
-        <a:font script="Yiii" typeface="Microsoft Yi Baiti"/>
-        <a:font script="Tibt" typeface="Microsoft Himalaya"/>
-        <a:font script="Thaa" typeface="MV Boli"/>
-        <a:font script="Deva" typeface="Mangal"/>
-        <a:font script="Telu" typeface="Gautami"/>
-        <a:font script="Taml" typeface="Latha"/>
-        <a:font script="Syrc" typeface="Estrangelo Edessa"/>
-        <a:font script="Orya" typeface="Kalinga"/>
-        <a:font script="Mlym" typeface="Kartika"/>
-        <a:font script="Laoo" typeface="DokChampa"/>
-        <a:font script="Sinh" typeface="Iskoola Pota"/>
-        <a:font script="Mong" typeface="Mongolian Baiti"/>
-        <a:font script="Viet" typeface="Arial"/>
-        <a:font script="Uigh" typeface="Microsoft Uighur"/>
-        <a:font script="Geor" typeface="Sylfaen"/>
-        <a:font script="Armn" typeface="Arial"/>
-        <a:font script="Bugi" typeface="Leelawadee UI"/>
-        <a:font script="Bopo" typeface="Microsoft JhengHei"/>
-        <a:font script="Java" typeface="Javanese Text"/>
-        <a:font script="Lisu" typeface="Segoe UI"/>
-        <a:font script="Mymr" typeface="Myanmar Text"/>
-        <a:font script="Nkoo" typeface="Ebrima"/>
-        <a:font script="Olck" typeface="Nirmala UI"/>
-        <a:font script="Osma" typeface="Ebrima"/>
-        <a:font script="Phag" typeface="Phagspa"/>
-        <a:font script="Syrn" typeface="Estrangelo Edessa"/>
-        <a:font script="Syrj" typeface="Estrangelo Edessa"/>
-        <a:font script="Syre" typeface="Estrangelo Edessa"/>
-        <a:font script="Sora" typeface="Nirmala UI"/>
-        <a:font script="Tale" typeface="Microsoft Tai Le"/>
-        <a:font script="Talu" typeface="Microsoft New Tai Lue"/>
-        <a:font script="Tfng" typeface="Ebrima"/>
-      </a:minorFont>
-    </a:fontScheme>
-    <a:fmtScheme name="Office">
-      <a:fillStyleLst>
-        <a:solidFill>
-          <a:schemeClr val="phClr"/>
-        </a:solidFill>
-        <a:gradFill rotWithShape="1">
-          <a:gsLst>
-            <a:gs pos="0">
-              <a:schemeClr val="phClr">
-                <a:lumMod val="110000"/>
-                <a:satMod val="105000"/>
-                <a:tint val="67000"/>
-              </a:schemeClr>
-            </a:gs>
-            <a:gs pos="50000">
-              <a:schemeClr val="phClr">
-                <a:lumMod val="105000"/>
-                <a:satMod val="103000"/>
-                <a:tint val="73000"/>
-              </a:schemeClr>
-            </a:gs>
-            <a:gs pos="100000">
-              <a:schemeClr val="phClr">
-                <a:lumMod val="105000"/>
-                <a:satMod val="109000"/>
-                <a:tint val="81000"/>
-              </a:schemeClr>
-            </a:gs>
-          </a:gsLst>
-          <a:lin ang="5400000" scaled="0"/>
-        </a:gradFill>
-        <a:gradFill rotWithShape="1">
-          <a:gsLst>
-            <a:gs pos="0">
-              <a:schemeClr val="phClr">
-                <a:satMod val="103000"/>
-                <a:lumMod val="102000"/>
-                <a:tint val="94000"/>
-              </a:schemeClr>
-            </a:gs>
-            <a:gs pos="50000">
-              <a:schemeClr val="phClr">
-                <a:satMod val="110000"/>
-                <a:lumMod val="100000"/>
-                <a:shade val="100000"/>
-              </a:schemeClr>
-            </a:gs>
-            <a:gs pos="100000">
-              <a:schemeClr val="phClr">
-                <a:lumMod val="99000"/>
-                <a:satMod val="120000"/>
-                <a:shade val="78000"/>
-              </a:schemeClr>
-            </a:gs>
-          </a:gsLst>
-          <a:lin ang="5400000" scaled="0"/>
-        </a:gradFill>
-      </a:fillStyleLst>
-      <a:lnStyleLst>
-        <a:ln w="6350" cap="flat" cmpd="sng" algn="ctr">
-          <a:solidFill>
-            <a:schemeClr val="phClr"/>
-          </a:solidFill>
-          <a:prstDash val="solid"/>
-          <a:miter lim="800000"/>
-        </a:ln>
-        <a:ln w="12700" cap="flat" cmpd="sng" algn="ctr">
-          <a:solidFill>
-            <a:schemeClr val="phClr"/>
-          </a:solidFill>
-          <a:prstDash val="solid"/>
-          <a:miter lim="800000"/>
-        </a:ln>
-        <a:ln w="19050" cap="flat" cmpd="sng" algn="ctr">
-          <a:solidFill>
-            <a:schemeClr val="phClr"/>
-          </a:solidFill>
-          <a:prstDash val="solid"/>
-          <a:miter lim="800000"/>
-        </a:ln>
-      </a:lnStyleLst>
-      <a:effectStyleLst>
-        <a:effectStyle>
-          <a:effectLst/>
-        </a:effectStyle>
-        <a:effectStyle>
-          <a:effectLst/>
-        </a:effectStyle>
-        <a:effectStyle>
-          <a:effectLst>
-            <a:outerShdw blurRad="57150" dist="19050" dir="5400000" algn="ctr" rotWithShape="0">
-              <a:srgbClr val="000000">
-                <a:alpha val="63000"/>
-              </a:srgbClr>
-            </a:outerShdw>
-          </a:effectLst>
-        </a:effectStyle>
-      </a:effectStyleLst>
-      <a:bgFillStyleLst>
-        <a:solidFill>
-          <a:schemeClr val="phClr"/>
-        </a:solidFill>
-        <a:solidFill>
-          <a:schemeClr val="phClr">
-            <a:tint val="95000"/>
-            <a:satMod val="170000"/>
-          </a:schemeClr>
-        </a:solidFill>
-        <a:gradFill rotWithShape="1">
-          <a:gsLst>
-            <a:gs pos="0">
-              <a:schemeClr val="phClr">
-                <a:tint val="93000"/>
-                <a:satMod val="150000"/>
-                <a:shade val="98000"/>
-                <a:lumMod val="102000"/>
-              </a:schemeClr>
-            </a:gs>
-            <a:gs pos="50000">
-              <a:schemeClr val="phClr">
-                <a:tint val="98000"/>
-                <a:satMod val="130000"/>
-                <a:shade val="90000"/>
-                <a:lumMod val="103000"/>
-              </a:schemeClr>
-            </a:gs>
-            <a:gs pos="100000">
-              <a:schemeClr val="phClr">
-                <a:shade val="63000"/>
-                <a:satMod val="120000"/>
-              </a:schemeClr>
-            </a:gs>
-          </a:gsLst>
-          <a:lin ang="5400000" scaled="0"/>
-        </a:gradFill>
-      </a:bgFillStyleLst>
-    </a:fmtScheme>
-  </a:themeElements>
-  <a:objectDefaults/>
-  <a:extraClrSchemeLst/>
-  <a:extLst>
-    <a:ext uri="{05A4C25C-085E-4340-85A3-A5531E510DB2}">
-      <thm15:themeFamily xmlns:thm15="http://schemas.microsoft.com/office/thememl/2012/main" name="Office Theme" id="{62F939B6-93AF-4DB8-9C6B-D6C7DFDC589F}" vid="{4A3C46E8-61CC-4603-A589-7422A47A8E4A}"/>
-    </a:ext>
-  </a:extLst>
-</a:theme>
 </file>
</xml_diff>